<commit_message>
Ro-Bomberman toegevoegd aan presentatie
</commit_message>
<xml_diff>
--- a/SilverSurferVerslag/Presentatie Eind/Presentatie eindverslag - team zilver.pptx
+++ b/SilverSurferVerslag/Presentatie Eind/Presentatie eindverslag - team zilver.pptx
@@ -5,10 +5,10 @@
     <p:sldMasterId id="2147483648" r:id="rId1"/>
   </p:sldMasterIdLst>
   <p:notesMasterIdLst>
-    <p:notesMasterId r:id="rId15"/>
+    <p:notesMasterId r:id="rId18"/>
   </p:notesMasterIdLst>
   <p:handoutMasterIdLst>
-    <p:handoutMasterId r:id="rId16"/>
+    <p:handoutMasterId r:id="rId19"/>
   </p:handoutMasterIdLst>
   <p:sldIdLst>
     <p:sldId id="256" r:id="rId2"/>
@@ -24,8 +24,11 @@
     <p:sldId id="265" r:id="rId12"/>
     <p:sldId id="266" r:id="rId13"/>
     <p:sldId id="267" r:id="rId14"/>
+    <p:sldId id="270" r:id="rId15"/>
+    <p:sldId id="271" r:id="rId16"/>
+    <p:sldId id="272" r:id="rId17"/>
   </p:sldIdLst>
-  <p:sldSz cx="10077450" cy="7562850" type="screen4x3"/>
+  <p:sldSz cx="10077450" cy="7562850"/>
   <p:notesSz cx="7559675" cy="10691813"/>
   <p:defaultTextStyle>
     <a:defPPr>
@@ -1595,6 +1598,222 @@
 </p:notes>
 </file>
 
+<file path=ppt/notesSlides/notesSlide14.xml><?xml version="1.0" encoding="utf-8"?>
+<p:notes xmlns:a="http://schemas.openxmlformats.org/drawingml/2006/main" xmlns:r="http://schemas.openxmlformats.org/officeDocument/2006/relationships" xmlns:p="http://schemas.openxmlformats.org/presentationml/2006/main">
+  <p:cSld>
+    <p:spTree>
+      <p:nvGrpSpPr>
+        <p:cNvPr id="1" name=""/>
+        <p:cNvGrpSpPr/>
+        <p:nvPr/>
+      </p:nvGrpSpPr>
+      <p:grpSpPr>
+        <a:xfrm>
+          <a:off x="0" y="0"/>
+          <a:ext cx="0" cy="0"/>
+          <a:chOff x="0" y="0"/>
+          <a:chExt cx="0" cy="0"/>
+        </a:xfrm>
+      </p:grpSpPr>
+      <p:sp>
+        <p:nvSpPr>
+          <p:cNvPr id="2" name="Tijdelijke aanduiding voor dia-afbeelding 1"/>
+          <p:cNvSpPr>
+            <a:spLocks noGrp="1" noRot="1" noChangeAspect="1" noResize="1"/>
+          </p:cNvSpPr>
+          <p:nvPr>
+            <p:ph type="sldImg"/>
+          </p:nvPr>
+        </p:nvSpPr>
+        <p:spPr>
+          <a:xfrm>
+            <a:off x="1108075" y="812800"/>
+            <a:ext cx="5341938" cy="4008438"/>
+          </a:xfrm>
+          <a:solidFill>
+            <a:srgbClr val="CFE7F5"/>
+          </a:solidFill>
+          <a:ln w="25400">
+            <a:solidFill>
+              <a:srgbClr val="808080"/>
+            </a:solidFill>
+            <a:prstDash val="solid"/>
+          </a:ln>
+        </p:spPr>
+      </p:sp>
+      <p:sp>
+        <p:nvSpPr>
+          <p:cNvPr id="3" name="Tijdelijke aanduiding voor notities 2"/>
+          <p:cNvSpPr txBox="1">
+            <a:spLocks noGrp="1"/>
+          </p:cNvSpPr>
+          <p:nvPr>
+            <p:ph type="body" sz="quarter" idx="1"/>
+          </p:nvPr>
+        </p:nvSpPr>
+        <p:spPr/>
+        <p:txBody>
+          <a:bodyPr>
+            <a:spAutoFit/>
+          </a:bodyPr>
+          <a:lstStyle/>
+          <a:p>
+            <a:endParaRPr lang="en-US" dirty="0"/>
+          </a:p>
+        </p:txBody>
+      </p:sp>
+    </p:spTree>
+  </p:cSld>
+  <p:clrMapOvr>
+    <a:masterClrMapping/>
+  </p:clrMapOvr>
+</p:notes>
+</file>
+
+<file path=ppt/notesSlides/notesSlide15.xml><?xml version="1.0" encoding="utf-8"?>
+<p:notes xmlns:a="http://schemas.openxmlformats.org/drawingml/2006/main" xmlns:r="http://schemas.openxmlformats.org/officeDocument/2006/relationships" xmlns:p="http://schemas.openxmlformats.org/presentationml/2006/main">
+  <p:cSld>
+    <p:spTree>
+      <p:nvGrpSpPr>
+        <p:cNvPr id="1" name=""/>
+        <p:cNvGrpSpPr/>
+        <p:nvPr/>
+      </p:nvGrpSpPr>
+      <p:grpSpPr>
+        <a:xfrm>
+          <a:off x="0" y="0"/>
+          <a:ext cx="0" cy="0"/>
+          <a:chOff x="0" y="0"/>
+          <a:chExt cx="0" cy="0"/>
+        </a:xfrm>
+      </p:grpSpPr>
+      <p:sp>
+        <p:nvSpPr>
+          <p:cNvPr id="2" name="Tijdelijke aanduiding voor dia-afbeelding 1"/>
+          <p:cNvSpPr>
+            <a:spLocks noGrp="1" noRot="1" noChangeAspect="1" noResize="1"/>
+          </p:cNvSpPr>
+          <p:nvPr>
+            <p:ph type="sldImg"/>
+          </p:nvPr>
+        </p:nvSpPr>
+        <p:spPr>
+          <a:xfrm>
+            <a:off x="1108075" y="812800"/>
+            <a:ext cx="5341938" cy="4008438"/>
+          </a:xfrm>
+          <a:solidFill>
+            <a:srgbClr val="CFE7F5"/>
+          </a:solidFill>
+          <a:ln w="25400">
+            <a:solidFill>
+              <a:srgbClr val="808080"/>
+            </a:solidFill>
+            <a:prstDash val="solid"/>
+          </a:ln>
+        </p:spPr>
+      </p:sp>
+      <p:sp>
+        <p:nvSpPr>
+          <p:cNvPr id="3" name="Tijdelijke aanduiding voor notities 2"/>
+          <p:cNvSpPr txBox="1">
+            <a:spLocks noGrp="1"/>
+          </p:cNvSpPr>
+          <p:nvPr>
+            <p:ph type="body" sz="quarter" idx="1"/>
+          </p:nvPr>
+        </p:nvSpPr>
+        <p:spPr/>
+        <p:txBody>
+          <a:bodyPr>
+            <a:spAutoFit/>
+          </a:bodyPr>
+          <a:lstStyle/>
+          <a:p>
+            <a:endParaRPr lang="en-US" dirty="0"/>
+          </a:p>
+        </p:txBody>
+      </p:sp>
+    </p:spTree>
+  </p:cSld>
+  <p:clrMapOvr>
+    <a:masterClrMapping/>
+  </p:clrMapOvr>
+</p:notes>
+</file>
+
+<file path=ppt/notesSlides/notesSlide16.xml><?xml version="1.0" encoding="utf-8"?>
+<p:notes xmlns:a="http://schemas.openxmlformats.org/drawingml/2006/main" xmlns:r="http://schemas.openxmlformats.org/officeDocument/2006/relationships" xmlns:p="http://schemas.openxmlformats.org/presentationml/2006/main">
+  <p:cSld>
+    <p:spTree>
+      <p:nvGrpSpPr>
+        <p:cNvPr id="1" name=""/>
+        <p:cNvGrpSpPr/>
+        <p:nvPr/>
+      </p:nvGrpSpPr>
+      <p:grpSpPr>
+        <a:xfrm>
+          <a:off x="0" y="0"/>
+          <a:ext cx="0" cy="0"/>
+          <a:chOff x="0" y="0"/>
+          <a:chExt cx="0" cy="0"/>
+        </a:xfrm>
+      </p:grpSpPr>
+      <p:sp>
+        <p:nvSpPr>
+          <p:cNvPr id="2" name="Tijdelijke aanduiding voor dia-afbeelding 1"/>
+          <p:cNvSpPr>
+            <a:spLocks noGrp="1" noRot="1" noChangeAspect="1" noResize="1"/>
+          </p:cNvSpPr>
+          <p:nvPr>
+            <p:ph type="sldImg"/>
+          </p:nvPr>
+        </p:nvSpPr>
+        <p:spPr>
+          <a:xfrm>
+            <a:off x="1108075" y="812800"/>
+            <a:ext cx="5341938" cy="4008438"/>
+          </a:xfrm>
+          <a:solidFill>
+            <a:srgbClr val="CFE7F5"/>
+          </a:solidFill>
+          <a:ln w="25400">
+            <a:solidFill>
+              <a:srgbClr val="808080"/>
+            </a:solidFill>
+            <a:prstDash val="solid"/>
+          </a:ln>
+        </p:spPr>
+      </p:sp>
+      <p:sp>
+        <p:nvSpPr>
+          <p:cNvPr id="3" name="Tijdelijke aanduiding voor notities 2"/>
+          <p:cNvSpPr txBox="1">
+            <a:spLocks noGrp="1"/>
+          </p:cNvSpPr>
+          <p:nvPr>
+            <p:ph type="body" sz="quarter" idx="1"/>
+          </p:nvPr>
+        </p:nvSpPr>
+        <p:spPr/>
+        <p:txBody>
+          <a:bodyPr>
+            <a:spAutoFit/>
+          </a:bodyPr>
+          <a:lstStyle/>
+          <a:p>
+            <a:endParaRPr lang="en-US" dirty="0"/>
+          </a:p>
+        </p:txBody>
+      </p:sp>
+    </p:spTree>
+  </p:cSld>
+  <p:clrMapOvr>
+    <a:masterClrMapping/>
+  </p:clrMapOvr>
+</p:notes>
+</file>
+
 <file path=ppt/notesSlides/notesSlide2.xml><?xml version="1.0" encoding="utf-8"?>
 <p:notes xmlns:a="http://schemas.openxmlformats.org/drawingml/2006/main" xmlns:r="http://schemas.openxmlformats.org/officeDocument/2006/relationships" xmlns:p="http://schemas.openxmlformats.org/presentationml/2006/main">
   <p:cSld>
@@ -1802,11 +2021,7 @@
             </a:r>
             <a:r>
               <a:rPr lang="en-US" baseline="0" dirty="0" smtClean="0"/>
-              <a:t> slide: </a:t>
-            </a:r>
-            <a:r>
-              <a:rPr lang="en-US" baseline="0" dirty="0" smtClean="0"/>
-              <a:t>Maar </a:t>
+              <a:t> slide: Maar </a:t>
             </a:r>
             <a:r>
               <a:rPr lang="en-US" baseline="0" dirty="0" err="1" smtClean="0"/>
@@ -2023,11 +2238,7 @@
             </a:r>
             <a:r>
               <a:rPr lang="en-US" baseline="0" dirty="0" smtClean="0"/>
-              <a:t> slide: </a:t>
-            </a:r>
-            <a:r>
-              <a:rPr lang="en-US" baseline="0" dirty="0" smtClean="0"/>
-              <a:t>Al </a:t>
+              <a:t> slide: Al </a:t>
             </a:r>
             <a:r>
               <a:rPr lang="en-US" baseline="0" dirty="0" err="1" smtClean="0"/>
@@ -4341,13 +4552,13 @@
   <p:clrMapOvr>
     <a:masterClrMapping/>
   </p:clrMapOvr>
-  <mc:AlternateContent xmlns:mc="http://schemas.openxmlformats.org/markup-compatibility/2006">
-    <mc:Choice xmlns:p14="http://schemas.microsoft.com/office/powerpoint/2010/main" Requires="p14">
+  <mc:AlternateContent xmlns:mc="http://schemas.openxmlformats.org/markup-compatibility/2006" xmlns:p14="http://schemas.microsoft.com/office/powerpoint/2010/main">
+    <mc:Choice Requires="p14">
       <p:transition spd="med" p14:dur="700">
         <p:fade/>
       </p:transition>
     </mc:Choice>
-    <mc:Fallback>
+    <mc:Fallback xmlns="">
       <p:transition spd="med">
         <p:fade/>
       </p:transition>
@@ -4521,13 +4732,13 @@
   <p:clrMapOvr>
     <a:masterClrMapping/>
   </p:clrMapOvr>
-  <mc:AlternateContent xmlns:mc="http://schemas.openxmlformats.org/markup-compatibility/2006">
-    <mc:Choice xmlns:p14="http://schemas.microsoft.com/office/powerpoint/2010/main" Requires="p14">
+  <mc:AlternateContent xmlns:mc="http://schemas.openxmlformats.org/markup-compatibility/2006" xmlns:p14="http://schemas.microsoft.com/office/powerpoint/2010/main">
+    <mc:Choice Requires="p14">
       <p:transition spd="med" p14:dur="700">
         <p:fade/>
       </p:transition>
     </mc:Choice>
-    <mc:Fallback>
+    <mc:Fallback xmlns="">
       <p:transition spd="med">
         <p:fade/>
       </p:transition>
@@ -4711,13 +4922,13 @@
   <p:clrMapOvr>
     <a:masterClrMapping/>
   </p:clrMapOvr>
-  <mc:AlternateContent xmlns:mc="http://schemas.openxmlformats.org/markup-compatibility/2006">
-    <mc:Choice xmlns:p14="http://schemas.microsoft.com/office/powerpoint/2010/main" Requires="p14">
+  <mc:AlternateContent xmlns:mc="http://schemas.openxmlformats.org/markup-compatibility/2006" xmlns:p14="http://schemas.microsoft.com/office/powerpoint/2010/main">
+    <mc:Choice Requires="p14">
       <p:transition spd="med" p14:dur="700">
         <p:fade/>
       </p:transition>
     </mc:Choice>
-    <mc:Fallback>
+    <mc:Fallback xmlns="">
       <p:transition spd="med">
         <p:fade/>
       </p:transition>
@@ -4891,13 +5102,13 @@
   <p:clrMapOvr>
     <a:masterClrMapping/>
   </p:clrMapOvr>
-  <mc:AlternateContent xmlns:mc="http://schemas.openxmlformats.org/markup-compatibility/2006">
-    <mc:Choice xmlns:p14="http://schemas.microsoft.com/office/powerpoint/2010/main" Requires="p14">
+  <mc:AlternateContent xmlns:mc="http://schemas.openxmlformats.org/markup-compatibility/2006" xmlns:p14="http://schemas.microsoft.com/office/powerpoint/2010/main">
+    <mc:Choice Requires="p14">
       <p:transition spd="med" p14:dur="700">
         <p:fade/>
       </p:transition>
     </mc:Choice>
-    <mc:Fallback>
+    <mc:Fallback xmlns="">
       <p:transition spd="med">
         <p:fade/>
       </p:transition>
@@ -5147,13 +5358,13 @@
   <p:clrMapOvr>
     <a:masterClrMapping/>
   </p:clrMapOvr>
-  <mc:AlternateContent xmlns:mc="http://schemas.openxmlformats.org/markup-compatibility/2006">
-    <mc:Choice xmlns:p14="http://schemas.microsoft.com/office/powerpoint/2010/main" Requires="p14">
+  <mc:AlternateContent xmlns:mc="http://schemas.openxmlformats.org/markup-compatibility/2006" xmlns:p14="http://schemas.microsoft.com/office/powerpoint/2010/main">
+    <mc:Choice Requires="p14">
       <p:transition spd="med" p14:dur="700">
         <p:fade/>
       </p:transition>
     </mc:Choice>
-    <mc:Fallback>
+    <mc:Fallback xmlns="">
       <p:transition spd="med">
         <p:fade/>
       </p:transition>
@@ -5445,13 +5656,13 @@
   <p:clrMapOvr>
     <a:masterClrMapping/>
   </p:clrMapOvr>
-  <mc:AlternateContent xmlns:mc="http://schemas.openxmlformats.org/markup-compatibility/2006">
-    <mc:Choice xmlns:p14="http://schemas.microsoft.com/office/powerpoint/2010/main" Requires="p14">
+  <mc:AlternateContent xmlns:mc="http://schemas.openxmlformats.org/markup-compatibility/2006" xmlns:p14="http://schemas.microsoft.com/office/powerpoint/2010/main">
+    <mc:Choice Requires="p14">
       <p:transition spd="med" p14:dur="700">
         <p:fade/>
       </p:transition>
     </mc:Choice>
-    <mc:Fallback>
+    <mc:Fallback xmlns="">
       <p:transition spd="med">
         <p:fade/>
       </p:transition>
@@ -5882,13 +6093,13 @@
   <p:clrMapOvr>
     <a:masterClrMapping/>
   </p:clrMapOvr>
-  <mc:AlternateContent xmlns:mc="http://schemas.openxmlformats.org/markup-compatibility/2006">
-    <mc:Choice xmlns:p14="http://schemas.microsoft.com/office/powerpoint/2010/main" Requires="p14">
+  <mc:AlternateContent xmlns:mc="http://schemas.openxmlformats.org/markup-compatibility/2006" xmlns:p14="http://schemas.microsoft.com/office/powerpoint/2010/main">
+    <mc:Choice Requires="p14">
       <p:transition spd="med" p14:dur="700">
         <p:fade/>
       </p:transition>
     </mc:Choice>
-    <mc:Fallback>
+    <mc:Fallback xmlns="">
       <p:transition spd="med">
         <p:fade/>
       </p:transition>
@@ -6010,13 +6221,13 @@
   <p:clrMapOvr>
     <a:masterClrMapping/>
   </p:clrMapOvr>
-  <mc:AlternateContent xmlns:mc="http://schemas.openxmlformats.org/markup-compatibility/2006">
-    <mc:Choice xmlns:p14="http://schemas.microsoft.com/office/powerpoint/2010/main" Requires="p14">
+  <mc:AlternateContent xmlns:mc="http://schemas.openxmlformats.org/markup-compatibility/2006" xmlns:p14="http://schemas.microsoft.com/office/powerpoint/2010/main">
+    <mc:Choice Requires="p14">
       <p:transition spd="med" p14:dur="700">
         <p:fade/>
       </p:transition>
     </mc:Choice>
-    <mc:Fallback>
+    <mc:Fallback xmlns="">
       <p:transition spd="med">
         <p:fade/>
       </p:transition>
@@ -6115,13 +6326,13 @@
   <p:clrMapOvr>
     <a:masterClrMapping/>
   </p:clrMapOvr>
-  <mc:AlternateContent xmlns:mc="http://schemas.openxmlformats.org/markup-compatibility/2006">
-    <mc:Choice xmlns:p14="http://schemas.microsoft.com/office/powerpoint/2010/main" Requires="p14">
+  <mc:AlternateContent xmlns:mc="http://schemas.openxmlformats.org/markup-compatibility/2006" xmlns:p14="http://schemas.microsoft.com/office/powerpoint/2010/main">
+    <mc:Choice Requires="p14">
       <p:transition spd="med" p14:dur="700">
         <p:fade/>
       </p:transition>
     </mc:Choice>
-    <mc:Fallback>
+    <mc:Fallback xmlns="">
       <p:transition spd="med">
         <p:fade/>
       </p:transition>
@@ -6403,13 +6614,13 @@
   <p:clrMapOvr>
     <a:masterClrMapping/>
   </p:clrMapOvr>
-  <mc:AlternateContent xmlns:mc="http://schemas.openxmlformats.org/markup-compatibility/2006">
-    <mc:Choice xmlns:p14="http://schemas.microsoft.com/office/powerpoint/2010/main" Requires="p14">
+  <mc:AlternateContent xmlns:mc="http://schemas.openxmlformats.org/markup-compatibility/2006" xmlns:p14="http://schemas.microsoft.com/office/powerpoint/2010/main">
+    <mc:Choice Requires="p14">
       <p:transition spd="med" p14:dur="700">
         <p:fade/>
       </p:transition>
     </mc:Choice>
-    <mc:Fallback>
+    <mc:Fallback xmlns="">
       <p:transition spd="med">
         <p:fade/>
       </p:transition>
@@ -6666,13 +6877,13 @@
   <p:clrMapOvr>
     <a:masterClrMapping/>
   </p:clrMapOvr>
-  <mc:AlternateContent xmlns:mc="http://schemas.openxmlformats.org/markup-compatibility/2006">
-    <mc:Choice xmlns:p14="http://schemas.microsoft.com/office/powerpoint/2010/main" Requires="p14">
+  <mc:AlternateContent xmlns:mc="http://schemas.openxmlformats.org/markup-compatibility/2006" xmlns:p14="http://schemas.microsoft.com/office/powerpoint/2010/main">
+    <mc:Choice Requires="p14">
       <p:transition spd="med" p14:dur="700">
         <p:fade/>
       </p:transition>
     </mc:Choice>
-    <mc:Fallback>
+    <mc:Fallback xmlns="">
       <p:transition spd="med">
         <p:fade/>
       </p:transition>
@@ -7207,13 +7418,13 @@
     <p:sldLayoutId id="2147483658" r:id="rId10"/>
     <p:sldLayoutId id="2147483659" r:id="rId11"/>
   </p:sldLayoutIdLst>
-  <mc:AlternateContent xmlns:mc="http://schemas.openxmlformats.org/markup-compatibility/2006">
-    <mc:Choice xmlns:p14="http://schemas.microsoft.com/office/powerpoint/2010/main" Requires="p14">
+  <mc:AlternateContent xmlns:mc="http://schemas.openxmlformats.org/markup-compatibility/2006" xmlns:p14="http://schemas.microsoft.com/office/powerpoint/2010/main">
+    <mc:Choice Requires="p14">
       <p:transition spd="med" p14:dur="700">
         <p:fade/>
       </p:transition>
     </mc:Choice>
-    <mc:Fallback>
+    <mc:Fallback xmlns="">
       <p:transition spd="med">
         <p:fade/>
       </p:transition>
@@ -7272,7 +7483,7 @@
       </p:grpSpPr>
       <p:pic>
         <p:nvPicPr>
-          <p:cNvPr id="2" name=""/>
+          <p:cNvPr id="2" name="Afbeelding 1"/>
           <p:cNvPicPr>
             <a:picLocks noChangeAspect="1"/>
           </p:cNvPicPr>
@@ -7818,13 +8029,13 @@
   <p:clrMapOvr>
     <a:masterClrMapping/>
   </p:clrMapOvr>
-  <mc:AlternateContent xmlns:mc="http://schemas.openxmlformats.org/markup-compatibility/2006">
-    <mc:Choice xmlns:p14="http://schemas.microsoft.com/office/powerpoint/2010/main" Requires="p14">
+  <mc:AlternateContent xmlns:mc="http://schemas.openxmlformats.org/markup-compatibility/2006" xmlns:p14="http://schemas.microsoft.com/office/powerpoint/2010/main">
+    <mc:Choice Requires="p14">
       <p:transition spd="med" p14:dur="700">
         <p:fade/>
       </p:transition>
     </mc:Choice>
-    <mc:Fallback>
+    <mc:Fallback xmlns="">
       <p:transition spd="med">
         <p:fade/>
       </p:transition>
@@ -8968,13 +9179,13 @@
   <p:clrMapOvr>
     <a:masterClrMapping/>
   </p:clrMapOvr>
-  <mc:AlternateContent xmlns:mc="http://schemas.openxmlformats.org/markup-compatibility/2006">
-    <mc:Choice xmlns:p14="http://schemas.microsoft.com/office/powerpoint/2010/main" Requires="p14">
+  <mc:AlternateContent xmlns:mc="http://schemas.openxmlformats.org/markup-compatibility/2006" xmlns:p14="http://schemas.microsoft.com/office/powerpoint/2010/main">
+    <mc:Choice Requires="p14">
       <p:transition spd="med" p14:dur="700">
         <p:fade/>
       </p:transition>
     </mc:Choice>
-    <mc:Fallback>
+    <mc:Fallback xmlns="">
       <p:transition spd="med">
         <p:fade/>
       </p:transition>
@@ -10064,13 +10275,13 @@
   <p:clrMapOvr>
     <a:masterClrMapping/>
   </p:clrMapOvr>
-  <mc:AlternateContent xmlns:mc="http://schemas.openxmlformats.org/markup-compatibility/2006">
-    <mc:Choice xmlns:p14="http://schemas.microsoft.com/office/powerpoint/2010/main" Requires="p14">
+  <mc:AlternateContent xmlns:mc="http://schemas.openxmlformats.org/markup-compatibility/2006" xmlns:p14="http://schemas.microsoft.com/office/powerpoint/2010/main">
+    <mc:Choice Requires="p14">
       <p:transition spd="med" p14:dur="700">
         <p:fade/>
       </p:transition>
     </mc:Choice>
-    <mc:Fallback>
+    <mc:Fallback xmlns="">
       <p:transition spd="med">
         <p:fade/>
       </p:transition>
@@ -10714,7 +10925,7 @@
       </p:pic>
       <p:pic>
         <p:nvPicPr>
-          <p:cNvPr id="4" name=""/>
+          <p:cNvPr id="4" name="Afbeelding 3"/>
           <p:cNvPicPr>
             <a:picLocks noChangeAspect="1"/>
           </p:cNvPicPr>
@@ -10742,7 +10953,7 @@
         </p:blipFill>
         <p:spPr>
           <a:xfrm>
-            <a:off x="2194560" y="1611000"/>
+            <a:off x="934269" y="1611000"/>
             <a:ext cx="5394960" cy="5439600"/>
           </a:xfrm>
           <a:prstGeom prst="rect">
@@ -11030,13 +11241,13 @@
   <p:clrMapOvr>
     <a:masterClrMapping/>
   </p:clrMapOvr>
-  <mc:AlternateContent xmlns:mc="http://schemas.openxmlformats.org/markup-compatibility/2006">
-    <mc:Choice xmlns:p14="http://schemas.microsoft.com/office/powerpoint/2010/main" Requires="p14">
+  <mc:AlternateContent xmlns:mc="http://schemas.openxmlformats.org/markup-compatibility/2006" xmlns:p14="http://schemas.microsoft.com/office/powerpoint/2010/main">
+    <mc:Choice Requires="p14">
       <p:transition spd="med" p14:dur="700">
         <p:fade/>
       </p:transition>
     </mc:Choice>
-    <mc:Fallback>
+    <mc:Fallback xmlns="">
       <p:transition spd="med">
         <p:fade/>
       </p:transition>
@@ -11438,13 +11649,13 @@
   <p:clrMapOvr>
     <a:masterClrMapping/>
   </p:clrMapOvr>
-  <mc:AlternateContent xmlns:mc="http://schemas.openxmlformats.org/markup-compatibility/2006">
-    <mc:Choice xmlns:p14="http://schemas.microsoft.com/office/powerpoint/2010/main" Requires="p14">
+  <mc:AlternateContent xmlns:mc="http://schemas.openxmlformats.org/markup-compatibility/2006" xmlns:p14="http://schemas.microsoft.com/office/powerpoint/2010/main">
+    <mc:Choice Requires="p14">
       <p:transition spd="med" p14:dur="700">
         <p:fade/>
       </p:transition>
     </mc:Choice>
-    <mc:Fallback>
+    <mc:Fallback xmlns="">
       <p:transition spd="med">
         <p:fade/>
       </p:transition>
@@ -11542,6 +11753,3119 @@
 </p:sld>
 </file>
 
+<file path=ppt/slides/slide14.xml><?xml version="1.0" encoding="utf-8"?>
+<p:sld xmlns:a="http://schemas.openxmlformats.org/drawingml/2006/main" xmlns:r="http://schemas.openxmlformats.org/officeDocument/2006/relationships" xmlns:p="http://schemas.openxmlformats.org/presentationml/2006/main">
+  <p:cSld>
+    <p:spTree>
+      <p:nvGrpSpPr>
+        <p:cNvPr id="1" name=""/>
+        <p:cNvGrpSpPr/>
+        <p:nvPr/>
+      </p:nvGrpSpPr>
+      <p:grpSpPr>
+        <a:xfrm>
+          <a:off x="0" y="0"/>
+          <a:ext cx="0" cy="0"/>
+          <a:chOff x="0" y="0"/>
+          <a:chExt cx="0" cy="0"/>
+        </a:xfrm>
+      </p:grpSpPr>
+      <p:pic>
+        <p:nvPicPr>
+          <p:cNvPr id="8" name="Afbeelding 7"/>
+          <p:cNvPicPr>
+            <a:picLocks noChangeAspect="1"/>
+          </p:cNvPicPr>
+          <p:nvPr/>
+        </p:nvPicPr>
+        <p:blipFill>
+          <a:blip r:embed="rId3">
+            <a:alphaModFix/>
+            <a:lum bright="70000" contrast="-70000"/>
+          </a:blip>
+          <a:srcRect/>
+          <a:stretch>
+            <a:fillRect/>
+          </a:stretch>
+        </p:blipFill>
+        <p:spPr>
+          <a:xfrm>
+            <a:off x="5044603" y="3561971"/>
+            <a:ext cx="5520916" cy="4036695"/>
+          </a:xfrm>
+          <a:prstGeom prst="rect">
+            <a:avLst/>
+          </a:prstGeom>
+          <a:noFill/>
+          <a:ln>
+            <a:noFill/>
+          </a:ln>
+        </p:spPr>
+      </p:pic>
+      <p:sp>
+        <p:nvSpPr>
+          <p:cNvPr id="6" name="Titel 7"/>
+          <p:cNvSpPr txBox="1">
+            <a:spLocks/>
+          </p:cNvSpPr>
+          <p:nvPr/>
+        </p:nvSpPr>
+        <p:spPr>
+          <a:xfrm>
+            <a:off x="503280" y="300960"/>
+            <a:ext cx="9068760" cy="1262520"/>
+          </a:xfrm>
+          <a:prstGeom prst="rect">
+            <a:avLst/>
+          </a:prstGeom>
+        </p:spPr>
+        <p:txBody>
+          <a:bodyPr anchor="t"/>
+          <a:lstStyle>
+            <a:lvl1pPr algn="ctr" rtl="0" hangingPunct="0">
+              <a:tabLst/>
+              <a:defRPr lang="en-US" sz="4400" b="0" i="0" u="none" strike="noStrike" kern="1200">
+                <a:ln>
+                  <a:noFill/>
+                </a:ln>
+                <a:latin typeface="Arial" pitchFamily="18"/>
+              </a:defRPr>
+            </a:lvl1pPr>
+          </a:lstStyle>
+          <a:p>
+            <a:pPr>
+              <a:tabLst>
+                <a:tab pos="9053513" algn="r"/>
+              </a:tabLst>
+            </a:pPr>
+            <a:r>
+              <a:rPr lang="nl-BE" sz="5400" dirty="0" err="1" smtClean="0">
+                <a:solidFill>
+                  <a:schemeClr val="tx1">
+                    <a:lumMod val="50000"/>
+                    <a:lumOff val="50000"/>
+                  </a:schemeClr>
+                </a:solidFill>
+                <a:latin typeface="Impact" pitchFamily="34"/>
+                <a:ea typeface="WenQuanYi Micro Hei" pitchFamily="2"/>
+                <a:cs typeface="Lohit Hindi" pitchFamily="2"/>
+              </a:rPr>
+              <a:t>Ro-Bomberman</a:t>
+            </a:r>
+            <a:r>
+              <a:rPr lang="nl-BE" dirty="0" smtClean="0"/>
+              <a:t>	</a:t>
+            </a:r>
+            <a:r>
+              <a:rPr lang="nl-BE" sz="3200" dirty="0" smtClean="0">
+                <a:solidFill>
+                  <a:schemeClr val="tx1">
+                    <a:lumMod val="65000"/>
+                    <a:lumOff val="35000"/>
+                  </a:schemeClr>
+                </a:solidFill>
+                <a:latin typeface="Impact" pitchFamily="34"/>
+              </a:rPr>
+              <a:t>Spel</a:t>
+            </a:r>
+            <a:endParaRPr lang="nl-BE" sz="3200" dirty="0">
+              <a:solidFill>
+                <a:schemeClr val="tx1">
+                  <a:lumMod val="65000"/>
+                  <a:lumOff val="35000"/>
+                </a:schemeClr>
+              </a:solidFill>
+              <a:latin typeface="Impact" pitchFamily="34"/>
+              <a:ea typeface="WenQuanYi Micro Hei" pitchFamily="2"/>
+              <a:cs typeface="Lohit Hindi" pitchFamily="2"/>
+            </a:endParaRPr>
+          </a:p>
+        </p:txBody>
+      </p:sp>
+      <p:sp>
+        <p:nvSpPr>
+          <p:cNvPr id="7" name="Tekstvak 6"/>
+          <p:cNvSpPr txBox="1"/>
+          <p:nvPr/>
+        </p:nvSpPr>
+        <p:spPr>
+          <a:xfrm>
+            <a:off x="18720" y="7240320"/>
+            <a:ext cx="10051767" cy="282598"/>
+          </a:xfrm>
+          <a:prstGeom prst="rect">
+            <a:avLst/>
+          </a:prstGeom>
+          <a:noFill/>
+          <a:ln>
+            <a:noFill/>
+          </a:ln>
+        </p:spPr>
+        <p:txBody>
+          <a:bodyPr vert="horz" wrap="none" lIns="90000" tIns="45000" rIns="90000" bIns="45000" anchorCtr="0" compatLnSpc="0">
+            <a:spAutoFit/>
+          </a:bodyPr>
+          <a:lstStyle/>
+          <a:p>
+            <a:pPr marL="0" marR="0" lvl="0" indent="0" rtl="0" hangingPunct="0">
+              <a:lnSpc>
+                <a:spcPct val="100000"/>
+              </a:lnSpc>
+              <a:spcBef>
+                <a:spcPts val="0"/>
+              </a:spcBef>
+              <a:spcAft>
+                <a:spcPts val="0"/>
+              </a:spcAft>
+              <a:buNone/>
+              <a:tabLst>
+                <a:tab pos="4932363" algn="ctr"/>
+                <a:tab pos="9774238" algn="r"/>
+                <a:tab pos="11072813" algn="l"/>
+              </a:tabLst>
+              <a:defRPr sz="1800">
+                <a:solidFill>
+                  <a:srgbClr val="999999"/>
+                </a:solidFill>
+              </a:defRPr>
+            </a:pPr>
+            <a:r>
+              <a:rPr lang="en-US" sz="1300" b="0" i="0" u="none" strike="noStrike" kern="1200" dirty="0" err="1">
+                <a:ln>
+                  <a:noFill/>
+                </a:ln>
+                <a:solidFill>
+                  <a:srgbClr val="999999"/>
+                </a:solidFill>
+                <a:latin typeface="Arial" pitchFamily="18"/>
+                <a:ea typeface="WenQuanYi Micro Hei" pitchFamily="2"/>
+                <a:cs typeface="Lohit Hindi" pitchFamily="2"/>
+              </a:rPr>
+              <a:t>KULeuven</a:t>
+            </a:r>
+            <a:r>
+              <a:rPr lang="en-US" sz="1300" b="0" i="0" u="none" strike="noStrike" kern="1200" dirty="0">
+                <a:ln>
+                  <a:noFill/>
+                </a:ln>
+                <a:solidFill>
+                  <a:srgbClr val="999999"/>
+                </a:solidFill>
+                <a:latin typeface="Arial" pitchFamily="18"/>
+                <a:ea typeface="WenQuanYi Micro Hei" pitchFamily="2"/>
+                <a:cs typeface="Lohit Hindi" pitchFamily="2"/>
+              </a:rPr>
+              <a:t> 2012-2013	</a:t>
+            </a:r>
+            <a:r>
+              <a:rPr lang="en-US" sz="1300" b="0" i="0" u="none" strike="noStrike" kern="1200" dirty="0" smtClean="0">
+                <a:ln>
+                  <a:noFill/>
+                </a:ln>
+                <a:solidFill>
+                  <a:srgbClr val="999999"/>
+                </a:solidFill>
+                <a:latin typeface="Arial" pitchFamily="18"/>
+                <a:ea typeface="WenQuanYi Micro Hei" pitchFamily="2"/>
+                <a:cs typeface="Lohit Hindi" pitchFamily="2"/>
+              </a:rPr>
+              <a:t>P&amp;O </a:t>
+            </a:r>
+            <a:r>
+              <a:rPr lang="en-US" sz="1300" b="0" i="0" u="none" strike="noStrike" kern="1200" dirty="0" err="1">
+                <a:ln>
+                  <a:noFill/>
+                </a:ln>
+                <a:solidFill>
+                  <a:srgbClr val="999999"/>
+                </a:solidFill>
+                <a:latin typeface="Arial" pitchFamily="18"/>
+                <a:ea typeface="WenQuanYi Micro Hei" pitchFamily="2"/>
+                <a:cs typeface="Lohit Hindi" pitchFamily="2"/>
+              </a:rPr>
+              <a:t>Computerwetenschappen</a:t>
+            </a:r>
+            <a:r>
+              <a:rPr lang="en-US" sz="1300" b="0" i="0" u="none" strike="noStrike" kern="1200" dirty="0">
+                <a:ln>
+                  <a:noFill/>
+                </a:ln>
+                <a:solidFill>
+                  <a:srgbClr val="999999"/>
+                </a:solidFill>
+                <a:latin typeface="Arial" pitchFamily="18"/>
+                <a:ea typeface="WenQuanYi Micro Hei" pitchFamily="2"/>
+                <a:cs typeface="Lohit Hindi" pitchFamily="2"/>
+              </a:rPr>
+              <a:t> - Team </a:t>
+            </a:r>
+            <a:r>
+              <a:rPr lang="en-US" sz="1300" b="0" i="0" u="none" strike="noStrike" kern="1200" dirty="0" err="1" smtClean="0">
+                <a:ln>
+                  <a:noFill/>
+                </a:ln>
+                <a:solidFill>
+                  <a:srgbClr val="999999"/>
+                </a:solidFill>
+                <a:latin typeface="Arial" pitchFamily="18"/>
+                <a:ea typeface="WenQuanYi Micro Hei" pitchFamily="2"/>
+                <a:cs typeface="Lohit Hindi" pitchFamily="2"/>
+              </a:rPr>
+              <a:t>Zilver</a:t>
+            </a:r>
+            <a:r>
+              <a:rPr lang="en-US" sz="1300" dirty="0" smtClean="0">
+                <a:solidFill>
+                  <a:srgbClr val="999999"/>
+                </a:solidFill>
+                <a:latin typeface="Arial" pitchFamily="18"/>
+                <a:ea typeface="WenQuanYi Micro Hei" pitchFamily="2"/>
+                <a:cs typeface="Lohit Hindi" pitchFamily="2"/>
+              </a:rPr>
+              <a:t>	</a:t>
+            </a:r>
+            <a:fld id="{01643B32-A42A-4810-B4D4-9049586A656C}" type="slidenum">
+              <a:rPr lang="en-US" sz="1300" smtClean="0">
+                <a:solidFill>
+                  <a:srgbClr val="999999"/>
+                </a:solidFill>
+                <a:latin typeface="Arial" pitchFamily="18"/>
+                <a:ea typeface="WenQuanYi Micro Hei" pitchFamily="2"/>
+                <a:cs typeface="Lohit Hindi" pitchFamily="2"/>
+              </a:rPr>
+              <a:pPr marL="0" marR="0" lvl="0" indent="0" rtl="0" hangingPunct="0">
+                <a:lnSpc>
+                  <a:spcPct val="100000"/>
+                </a:lnSpc>
+                <a:spcBef>
+                  <a:spcPts val="0"/>
+                </a:spcBef>
+                <a:spcAft>
+                  <a:spcPts val="0"/>
+                </a:spcAft>
+                <a:buNone/>
+                <a:tabLst>
+                  <a:tab pos="4932363" algn="ctr"/>
+                  <a:tab pos="9774238" algn="r"/>
+                  <a:tab pos="11072813" algn="l"/>
+                </a:tabLst>
+                <a:defRPr sz="1800">
+                  <a:solidFill>
+                    <a:srgbClr val="999999"/>
+                  </a:solidFill>
+                </a:defRPr>
+              </a:pPr>
+              <a:t>14</a:t>
+            </a:fld>
+            <a:endParaRPr lang="en-US" sz="1300" b="0" i="0" u="none" strike="noStrike" kern="1200" dirty="0">
+              <a:ln>
+                <a:noFill/>
+              </a:ln>
+              <a:solidFill>
+                <a:srgbClr val="999999"/>
+              </a:solidFill>
+              <a:latin typeface="Arial" pitchFamily="18"/>
+              <a:ea typeface="WenQuanYi Micro Hei" pitchFamily="2"/>
+              <a:cs typeface="Lohit Hindi" pitchFamily="2"/>
+            </a:endParaRPr>
+          </a:p>
+        </p:txBody>
+      </p:sp>
+      <p:sp>
+        <p:nvSpPr>
+          <p:cNvPr id="9" name="Tekstvak 8"/>
+          <p:cNvSpPr txBox="1"/>
+          <p:nvPr/>
+        </p:nvSpPr>
+        <p:spPr>
+          <a:xfrm>
+            <a:off x="731519" y="1828800"/>
+            <a:ext cx="6546321" cy="4160711"/>
+          </a:xfrm>
+          <a:prstGeom prst="rect">
+            <a:avLst/>
+          </a:prstGeom>
+          <a:noFill/>
+          <a:ln>
+            <a:noFill/>
+          </a:ln>
+        </p:spPr>
+        <p:txBody>
+          <a:bodyPr vert="horz" wrap="none" lIns="90000" tIns="45000" rIns="90000" bIns="45000" anchorCtr="0" compatLnSpc="0">
+            <a:spAutoFit/>
+          </a:bodyPr>
+          <a:lstStyle/>
+          <a:p>
+            <a:pPr marL="0" marR="0" lvl="0" indent="-457200" hangingPunct="0">
+              <a:lnSpc>
+                <a:spcPct val="100000"/>
+              </a:lnSpc>
+              <a:spcBef>
+                <a:spcPts val="0"/>
+              </a:spcBef>
+              <a:spcAft>
+                <a:spcPts val="0"/>
+              </a:spcAft>
+              <a:buSzPct val="80000"/>
+              <a:buFont typeface="Arial" pitchFamily="34" charset="0"/>
+              <a:buChar char="»"/>
+              <a:tabLst/>
+              <a:defRPr sz="1800"/>
+            </a:pPr>
+            <a:r>
+              <a:rPr lang="en-US" sz="2800" dirty="0" err="1" smtClean="0">
+                <a:latin typeface="Arial" pitchFamily="18"/>
+                <a:ea typeface="WenQuanYi Micro Hei" pitchFamily="2"/>
+                <a:cs typeface="Lohit Hindi" pitchFamily="2"/>
+              </a:rPr>
+              <a:t>Doel</a:t>
+            </a:r>
+            <a:endParaRPr lang="en-US" sz="2800" dirty="0">
+              <a:latin typeface="Arial" pitchFamily="18"/>
+              <a:ea typeface="WenQuanYi Micro Hei" pitchFamily="2"/>
+              <a:cs typeface="Lohit Hindi" pitchFamily="2"/>
+            </a:endParaRPr>
+          </a:p>
+          <a:p>
+            <a:pPr marL="914400" lvl="4" indent="-457200" hangingPunct="0">
+              <a:buSzPct val="80000"/>
+              <a:buFont typeface="Arial" pitchFamily="34" charset="0"/>
+              <a:buChar char="»"/>
+              <a:defRPr sz="1800"/>
+            </a:pPr>
+            <a:r>
+              <a:rPr lang="en-US" sz="2400" dirty="0" smtClean="0">
+                <a:latin typeface="Arial" pitchFamily="18"/>
+                <a:ea typeface="WenQuanYi Micro Hei" pitchFamily="2"/>
+                <a:cs typeface="Lohit Hindi" pitchFamily="2"/>
+              </a:rPr>
+              <a:t>Robots </a:t>
+            </a:r>
+            <a:r>
+              <a:rPr lang="en-US" sz="2400" dirty="0" err="1" smtClean="0">
+                <a:latin typeface="Arial" pitchFamily="18"/>
+                <a:ea typeface="WenQuanYi Micro Hei" pitchFamily="2"/>
+                <a:cs typeface="Lohit Hindi" pitchFamily="2"/>
+              </a:rPr>
+              <a:t>proberen</a:t>
+            </a:r>
+            <a:r>
+              <a:rPr lang="en-US" sz="2400" dirty="0" smtClean="0">
+                <a:latin typeface="Arial" pitchFamily="18"/>
+                <a:ea typeface="WenQuanYi Micro Hei" pitchFamily="2"/>
+                <a:cs typeface="Lohit Hindi" pitchFamily="2"/>
+              </a:rPr>
+              <a:t> </a:t>
+            </a:r>
+            <a:r>
+              <a:rPr lang="en-US" sz="2400" dirty="0" err="1" smtClean="0">
+                <a:latin typeface="Arial" pitchFamily="18"/>
+                <a:ea typeface="WenQuanYi Micro Hei" pitchFamily="2"/>
+                <a:cs typeface="Lohit Hindi" pitchFamily="2"/>
+              </a:rPr>
+              <a:t>elkaar</a:t>
+            </a:r>
+            <a:r>
+              <a:rPr lang="en-US" sz="2400" dirty="0" smtClean="0">
+                <a:latin typeface="Arial" pitchFamily="18"/>
+                <a:ea typeface="WenQuanYi Micro Hei" pitchFamily="2"/>
+                <a:cs typeface="Lohit Hindi" pitchFamily="2"/>
+              </a:rPr>
+              <a:t> </a:t>
+            </a:r>
+            <a:r>
+              <a:rPr lang="en-US" sz="2400" dirty="0" err="1" smtClean="0">
+                <a:latin typeface="Arial" pitchFamily="18"/>
+                <a:ea typeface="WenQuanYi Micro Hei" pitchFamily="2"/>
+                <a:cs typeface="Lohit Hindi" pitchFamily="2"/>
+              </a:rPr>
+              <a:t>uit</a:t>
+            </a:r>
+            <a:r>
+              <a:rPr lang="en-US" sz="2400" dirty="0" smtClean="0">
+                <a:latin typeface="Arial" pitchFamily="18"/>
+                <a:ea typeface="WenQuanYi Micro Hei" pitchFamily="2"/>
+                <a:cs typeface="Lohit Hindi" pitchFamily="2"/>
+              </a:rPr>
+              <a:t> </a:t>
+            </a:r>
+            <a:r>
+              <a:rPr lang="en-US" sz="2400" dirty="0" err="1" smtClean="0">
+                <a:latin typeface="Arial" pitchFamily="18"/>
+                <a:ea typeface="WenQuanYi Micro Hei" pitchFamily="2"/>
+                <a:cs typeface="Lohit Hindi" pitchFamily="2"/>
+              </a:rPr>
+              <a:t>te</a:t>
+            </a:r>
+            <a:r>
+              <a:rPr lang="en-US" sz="2400" dirty="0" smtClean="0">
+                <a:latin typeface="Arial" pitchFamily="18"/>
+                <a:ea typeface="WenQuanYi Micro Hei" pitchFamily="2"/>
+                <a:cs typeface="Lohit Hindi" pitchFamily="2"/>
+              </a:rPr>
+              <a:t> </a:t>
+            </a:r>
+            <a:r>
+              <a:rPr lang="en-US" sz="2400" dirty="0" err="1" smtClean="0">
+                <a:latin typeface="Arial" pitchFamily="18"/>
+                <a:ea typeface="WenQuanYi Micro Hei" pitchFamily="2"/>
+                <a:cs typeface="Lohit Hindi" pitchFamily="2"/>
+              </a:rPr>
+              <a:t>schakelen</a:t>
+            </a:r>
+            <a:endParaRPr lang="en-US" sz="2400" dirty="0">
+              <a:latin typeface="Arial" pitchFamily="18"/>
+              <a:ea typeface="WenQuanYi Micro Hei" pitchFamily="2"/>
+              <a:cs typeface="Lohit Hindi" pitchFamily="2"/>
+            </a:endParaRPr>
+          </a:p>
+          <a:p>
+            <a:pPr marL="0" marR="0" lvl="2" indent="-457200" hangingPunct="0">
+              <a:lnSpc>
+                <a:spcPct val="100000"/>
+              </a:lnSpc>
+              <a:spcBef>
+                <a:spcPts val="0"/>
+              </a:spcBef>
+              <a:spcAft>
+                <a:spcPts val="0"/>
+              </a:spcAft>
+              <a:buSzPct val="80000"/>
+              <a:buFont typeface="Arial" pitchFamily="34" charset="0"/>
+              <a:buChar char="»"/>
+              <a:tabLst/>
+              <a:defRPr sz="1800"/>
+            </a:pPr>
+            <a:r>
+              <a:rPr lang="en-US" sz="2800" dirty="0" err="1" smtClean="0">
+                <a:latin typeface="Arial" pitchFamily="18"/>
+                <a:ea typeface="WenQuanYi Micro Hei" pitchFamily="2"/>
+                <a:cs typeface="Lohit Hindi" pitchFamily="2"/>
+              </a:rPr>
+              <a:t>Middelen</a:t>
+            </a:r>
+            <a:endParaRPr lang="en-US" sz="2800" dirty="0">
+              <a:latin typeface="Arial" pitchFamily="18"/>
+              <a:ea typeface="WenQuanYi Micro Hei" pitchFamily="2"/>
+              <a:cs typeface="Lohit Hindi" pitchFamily="2"/>
+            </a:endParaRPr>
+          </a:p>
+          <a:p>
+            <a:pPr marL="914400" lvl="4" indent="-457200" hangingPunct="0">
+              <a:buSzPct val="80000"/>
+              <a:buFont typeface="Arial" pitchFamily="34" charset="0"/>
+              <a:buChar char="»"/>
+              <a:defRPr sz="1800"/>
+            </a:pPr>
+            <a:r>
+              <a:rPr lang="en-US" sz="2400" dirty="0" err="1" smtClean="0">
+                <a:latin typeface="Arial" pitchFamily="18"/>
+                <a:ea typeface="WenQuanYi Micro Hei" pitchFamily="2"/>
+                <a:cs typeface="Lohit Hindi" pitchFamily="2"/>
+              </a:rPr>
+              <a:t>Virtuele</a:t>
+            </a:r>
+            <a:r>
+              <a:rPr lang="en-US" sz="2400" dirty="0" smtClean="0">
+                <a:latin typeface="Arial" pitchFamily="18"/>
+                <a:ea typeface="WenQuanYi Micro Hei" pitchFamily="2"/>
+                <a:cs typeface="Lohit Hindi" pitchFamily="2"/>
+              </a:rPr>
+              <a:t> </a:t>
+            </a:r>
+            <a:r>
+              <a:rPr lang="en-US" sz="2400" dirty="0" err="1" smtClean="0">
+                <a:latin typeface="Arial" pitchFamily="18"/>
+                <a:ea typeface="WenQuanYi Micro Hei" pitchFamily="2"/>
+                <a:cs typeface="Lohit Hindi" pitchFamily="2"/>
+              </a:rPr>
+              <a:t>tijds-bommen</a:t>
+            </a:r>
+            <a:r>
+              <a:rPr lang="en-US" sz="2400" dirty="0" smtClean="0">
+                <a:latin typeface="Arial" pitchFamily="18"/>
+                <a:ea typeface="WenQuanYi Micro Hei" pitchFamily="2"/>
+                <a:cs typeface="Lohit Hindi" pitchFamily="2"/>
+              </a:rPr>
+              <a:t> (‘server’)</a:t>
+            </a:r>
+          </a:p>
+          <a:p>
+            <a:pPr marL="914400" lvl="4" indent="-457200" hangingPunct="0">
+              <a:buSzPct val="80000"/>
+              <a:buFont typeface="Arial" pitchFamily="34" charset="0"/>
+              <a:buChar char="»"/>
+              <a:defRPr sz="1800"/>
+            </a:pPr>
+            <a:r>
+              <a:rPr lang="en-US" sz="2400" dirty="0" smtClean="0">
+                <a:latin typeface="Arial" pitchFamily="18"/>
+                <a:ea typeface="WenQuanYi Micro Hei" pitchFamily="2"/>
+                <a:cs typeface="Lohit Hindi" pitchFamily="2"/>
+              </a:rPr>
+              <a:t>Power-ups (barcodes)</a:t>
+            </a:r>
+          </a:p>
+          <a:p>
+            <a:pPr marL="0" marR="0" lvl="0" indent="-457200" hangingPunct="0">
+              <a:lnSpc>
+                <a:spcPct val="100000"/>
+              </a:lnSpc>
+              <a:spcBef>
+                <a:spcPts val="0"/>
+              </a:spcBef>
+              <a:spcAft>
+                <a:spcPts val="0"/>
+              </a:spcAft>
+              <a:buSzPct val="80000"/>
+              <a:buFont typeface="Arial" pitchFamily="34" charset="0"/>
+              <a:buChar char="»"/>
+              <a:tabLst/>
+              <a:defRPr sz="1800"/>
+            </a:pPr>
+            <a:r>
+              <a:rPr lang="en-US" sz="2800" dirty="0" err="1" smtClean="0">
+                <a:latin typeface="Arial" pitchFamily="18"/>
+                <a:ea typeface="WenQuanYi Micro Hei" pitchFamily="2"/>
+                <a:cs typeface="Lohit Hindi" pitchFamily="2"/>
+              </a:rPr>
+              <a:t>Uitdagingen</a:t>
+            </a:r>
+            <a:endParaRPr lang="en-US" sz="2800" dirty="0">
+              <a:latin typeface="Arial" pitchFamily="18"/>
+              <a:ea typeface="WenQuanYi Micro Hei" pitchFamily="2"/>
+              <a:cs typeface="Lohit Hindi" pitchFamily="2"/>
+            </a:endParaRPr>
+          </a:p>
+          <a:p>
+            <a:pPr marL="914400" lvl="4" indent="-457200" hangingPunct="0">
+              <a:buSzPct val="80000"/>
+              <a:buFont typeface="Arial" pitchFamily="34" charset="0"/>
+              <a:buChar char="»"/>
+              <a:defRPr sz="1800"/>
+            </a:pPr>
+            <a:r>
+              <a:rPr lang="en-US" sz="2400" dirty="0" err="1">
+                <a:latin typeface="Arial" pitchFamily="18"/>
+                <a:ea typeface="WenQuanYi Micro Hei" pitchFamily="2"/>
+                <a:cs typeface="Lohit Hindi" pitchFamily="2"/>
+              </a:rPr>
+              <a:t>O</a:t>
+            </a:r>
+            <a:r>
+              <a:rPr lang="en-US" sz="2400" dirty="0" err="1" smtClean="0">
+                <a:latin typeface="Arial" pitchFamily="18"/>
+                <a:ea typeface="WenQuanYi Micro Hei" pitchFamily="2"/>
+                <a:cs typeface="Lohit Hindi" pitchFamily="2"/>
+              </a:rPr>
+              <a:t>verleven</a:t>
+            </a:r>
+            <a:endParaRPr lang="en-US" sz="2400" dirty="0">
+              <a:latin typeface="Arial" pitchFamily="18"/>
+              <a:ea typeface="WenQuanYi Micro Hei" pitchFamily="2"/>
+              <a:cs typeface="Lohit Hindi" pitchFamily="2"/>
+            </a:endParaRPr>
+          </a:p>
+          <a:p>
+            <a:pPr marL="914400" lvl="4" indent="-457200" hangingPunct="0">
+              <a:buSzPct val="80000"/>
+              <a:buFont typeface="Arial" pitchFamily="34" charset="0"/>
+              <a:buChar char="»"/>
+              <a:defRPr sz="1800"/>
+            </a:pPr>
+            <a:r>
+              <a:rPr lang="en-US" sz="2400" dirty="0" err="1" smtClean="0">
+                <a:latin typeface="Arial" pitchFamily="18"/>
+                <a:ea typeface="WenQuanYi Micro Hei" pitchFamily="2"/>
+                <a:cs typeface="Lohit Hindi" pitchFamily="2"/>
+              </a:rPr>
+              <a:t>Obstakels</a:t>
+            </a:r>
+            <a:r>
+              <a:rPr lang="en-US" sz="2400" dirty="0" smtClean="0">
+                <a:latin typeface="Arial" pitchFamily="18"/>
+                <a:ea typeface="WenQuanYi Micro Hei" pitchFamily="2"/>
+                <a:cs typeface="Lohit Hindi" pitchFamily="2"/>
+              </a:rPr>
+              <a:t> </a:t>
+            </a:r>
+            <a:r>
+              <a:rPr lang="en-US" sz="2400" dirty="0" err="1" smtClean="0">
+                <a:latin typeface="Arial" pitchFamily="18"/>
+                <a:ea typeface="WenQuanYi Micro Hei" pitchFamily="2"/>
+                <a:cs typeface="Lohit Hindi" pitchFamily="2"/>
+              </a:rPr>
+              <a:t>wegruimen</a:t>
+            </a:r>
+            <a:endParaRPr lang="en-US" sz="2400" dirty="0" smtClean="0">
+              <a:latin typeface="Arial" pitchFamily="18"/>
+              <a:ea typeface="WenQuanYi Micro Hei" pitchFamily="2"/>
+              <a:cs typeface="Lohit Hindi" pitchFamily="2"/>
+            </a:endParaRPr>
+          </a:p>
+          <a:p>
+            <a:pPr marL="914400" lvl="4" indent="-457200" hangingPunct="0">
+              <a:buSzPct val="80000"/>
+              <a:buFont typeface="Arial" pitchFamily="34" charset="0"/>
+              <a:buChar char="»"/>
+              <a:defRPr sz="1800"/>
+            </a:pPr>
+            <a:r>
+              <a:rPr lang="en-US" sz="2400" dirty="0" err="1" smtClean="0">
+                <a:latin typeface="Arial" pitchFamily="18"/>
+                <a:ea typeface="WenQuanYi Micro Hei" pitchFamily="2"/>
+                <a:cs typeface="Lohit Hindi" pitchFamily="2"/>
+              </a:rPr>
+              <a:t>Doolhofverkenning</a:t>
+            </a:r>
+            <a:endParaRPr lang="en-US" sz="2400" dirty="0" smtClean="0">
+              <a:latin typeface="Arial" pitchFamily="18"/>
+              <a:ea typeface="WenQuanYi Micro Hei" pitchFamily="2"/>
+              <a:cs typeface="Lohit Hindi" pitchFamily="2"/>
+            </a:endParaRPr>
+          </a:p>
+          <a:p>
+            <a:pPr marL="457200" lvl="4" hangingPunct="0">
+              <a:buSzPct val="80000"/>
+              <a:defRPr sz="1800"/>
+            </a:pPr>
+            <a:endParaRPr lang="en-US" sz="2400" dirty="0" smtClean="0">
+              <a:latin typeface="Arial" pitchFamily="18"/>
+              <a:ea typeface="WenQuanYi Micro Hei" pitchFamily="2"/>
+              <a:cs typeface="Lohit Hindi" pitchFamily="2"/>
+            </a:endParaRPr>
+          </a:p>
+          <a:p>
+            <a:pPr marL="457200" lvl="4" hangingPunct="0">
+              <a:buSzPct val="80000"/>
+              <a:defRPr sz="1800"/>
+            </a:pPr>
+            <a:r>
+              <a:rPr lang="en-US" sz="2400" dirty="0" smtClean="0">
+                <a:latin typeface="Arial" pitchFamily="18"/>
+                <a:ea typeface="WenQuanYi Micro Hei" pitchFamily="2"/>
+                <a:cs typeface="Lohit Hindi" pitchFamily="2"/>
+              </a:rPr>
+              <a:t>… (</a:t>
+            </a:r>
+            <a:r>
+              <a:rPr lang="en-US" sz="2400" dirty="0" err="1" smtClean="0">
+                <a:latin typeface="Arial" pitchFamily="18"/>
+                <a:ea typeface="WenQuanYi Micro Hei" pitchFamily="2"/>
+                <a:cs typeface="Lohit Hindi" pitchFamily="2"/>
+              </a:rPr>
+              <a:t>zie</a:t>
+            </a:r>
+            <a:r>
+              <a:rPr lang="en-US" sz="2400" dirty="0" smtClean="0">
+                <a:latin typeface="Arial" pitchFamily="18"/>
+                <a:ea typeface="WenQuanYi Micro Hei" pitchFamily="2"/>
+                <a:cs typeface="Lohit Hindi" pitchFamily="2"/>
+              </a:rPr>
+              <a:t> </a:t>
+            </a:r>
+            <a:r>
+              <a:rPr lang="en-US" sz="2400" dirty="0" err="1" smtClean="0">
+                <a:latin typeface="Arial" pitchFamily="18"/>
+                <a:ea typeface="WenQuanYi Micro Hei" pitchFamily="2"/>
+                <a:cs typeface="Lohit Hindi" pitchFamily="2"/>
+              </a:rPr>
+              <a:t>verslag</a:t>
+            </a:r>
+            <a:r>
+              <a:rPr lang="en-US" sz="2400" dirty="0" smtClean="0">
+                <a:latin typeface="Arial" pitchFamily="18"/>
+                <a:ea typeface="WenQuanYi Micro Hei" pitchFamily="2"/>
+                <a:cs typeface="Lohit Hindi" pitchFamily="2"/>
+              </a:rPr>
+              <a:t>)</a:t>
+            </a:r>
+            <a:endParaRPr lang="en-US" sz="2400" dirty="0">
+              <a:latin typeface="Arial" pitchFamily="18"/>
+              <a:ea typeface="WenQuanYi Micro Hei" pitchFamily="2"/>
+              <a:cs typeface="Lohit Hindi" pitchFamily="2"/>
+            </a:endParaRPr>
+          </a:p>
+        </p:txBody>
+      </p:sp>
+    </p:spTree>
+    <p:extLst>
+      <p:ext uri="{BB962C8B-B14F-4D97-AF65-F5344CB8AC3E}">
+        <p14:creationId xmlns:p14="http://schemas.microsoft.com/office/powerpoint/2010/main" val="2842108802"/>
+      </p:ext>
+    </p:extLst>
+  </p:cSld>
+  <p:clrMapOvr>
+    <a:masterClrMapping/>
+  </p:clrMapOvr>
+  <mc:AlternateContent xmlns:mc="http://schemas.openxmlformats.org/markup-compatibility/2006" xmlns:p14="http://schemas.microsoft.com/office/powerpoint/2010/main">
+    <mc:Choice Requires="p14">
+      <p:transition spd="med" p14:dur="700">
+        <p:fade/>
+      </p:transition>
+    </mc:Choice>
+    <mc:Fallback xmlns="">
+      <p:transition spd="med">
+        <p:fade/>
+      </p:transition>
+    </mc:Fallback>
+  </mc:AlternateContent>
+  <p:timing>
+    <p:tnLst>
+      <p:par>
+        <p:cTn id="1" dur="indefinite" restart="never" nodeType="tmRoot">
+          <p:childTnLst>
+            <p:seq concurrent="1" nextAc="seek">
+              <p:cTn id="2" dur="indefinite" nodeType="mainSeq">
+                <p:childTnLst>
+                  <p:par>
+                    <p:cTn id="3" fill="hold">
+                      <p:stCondLst>
+                        <p:cond delay="indefinite"/>
+                      </p:stCondLst>
+                      <p:childTnLst>
+                        <p:par>
+                          <p:cTn id="4" fill="hold">
+                            <p:stCondLst>
+                              <p:cond delay="0"/>
+                            </p:stCondLst>
+                            <p:childTnLst>
+                              <p:par>
+                                <p:cTn id="5" presetID="10" presetClass="entr" presetSubtype="0" fill="hold" nodeType="clickEffect">
+                                  <p:stCondLst>
+                                    <p:cond delay="0"/>
+                                  </p:stCondLst>
+                                  <p:childTnLst>
+                                    <p:set>
+                                      <p:cBhvr>
+                                        <p:cTn id="6" dur="1" fill="hold">
+                                          <p:stCondLst>
+                                            <p:cond delay="0"/>
+                                          </p:stCondLst>
+                                        </p:cTn>
+                                        <p:tgtEl>
+                                          <p:spTgt spid="9">
+                                            <p:txEl>
+                                              <p:pRg st="0" end="0"/>
+                                            </p:txEl>
+                                          </p:spTgt>
+                                        </p:tgtEl>
+                                        <p:attrNameLst>
+                                          <p:attrName>style.visibility</p:attrName>
+                                        </p:attrNameLst>
+                                      </p:cBhvr>
+                                      <p:to>
+                                        <p:strVal val="visible"/>
+                                      </p:to>
+                                    </p:set>
+                                    <p:animEffect transition="in" filter="fade">
+                                      <p:cBhvr>
+                                        <p:cTn id="7" dur="500"/>
+                                        <p:tgtEl>
+                                          <p:spTgt spid="9">
+                                            <p:txEl>
+                                              <p:pRg st="0" end="0"/>
+                                            </p:txEl>
+                                          </p:spTgt>
+                                        </p:tgtEl>
+                                      </p:cBhvr>
+                                    </p:animEffect>
+                                  </p:childTnLst>
+                                </p:cTn>
+                              </p:par>
+                            </p:childTnLst>
+                          </p:cTn>
+                        </p:par>
+                      </p:childTnLst>
+                    </p:cTn>
+                  </p:par>
+                  <p:par>
+                    <p:cTn id="8" fill="hold">
+                      <p:stCondLst>
+                        <p:cond delay="indefinite"/>
+                      </p:stCondLst>
+                      <p:childTnLst>
+                        <p:par>
+                          <p:cTn id="9" fill="hold">
+                            <p:stCondLst>
+                              <p:cond delay="0"/>
+                            </p:stCondLst>
+                            <p:childTnLst>
+                              <p:par>
+                                <p:cTn id="10" presetID="10" presetClass="entr" presetSubtype="0" fill="hold" nodeType="clickEffect">
+                                  <p:stCondLst>
+                                    <p:cond delay="0"/>
+                                  </p:stCondLst>
+                                  <p:childTnLst>
+                                    <p:set>
+                                      <p:cBhvr>
+                                        <p:cTn id="11" dur="1" fill="hold">
+                                          <p:stCondLst>
+                                            <p:cond delay="0"/>
+                                          </p:stCondLst>
+                                        </p:cTn>
+                                        <p:tgtEl>
+                                          <p:spTgt spid="9">
+                                            <p:txEl>
+                                              <p:pRg st="1" end="1"/>
+                                            </p:txEl>
+                                          </p:spTgt>
+                                        </p:tgtEl>
+                                        <p:attrNameLst>
+                                          <p:attrName>style.visibility</p:attrName>
+                                        </p:attrNameLst>
+                                      </p:cBhvr>
+                                      <p:to>
+                                        <p:strVal val="visible"/>
+                                      </p:to>
+                                    </p:set>
+                                    <p:animEffect transition="in" filter="fade">
+                                      <p:cBhvr>
+                                        <p:cTn id="12" dur="500"/>
+                                        <p:tgtEl>
+                                          <p:spTgt spid="9">
+                                            <p:txEl>
+                                              <p:pRg st="1" end="1"/>
+                                            </p:txEl>
+                                          </p:spTgt>
+                                        </p:tgtEl>
+                                      </p:cBhvr>
+                                    </p:animEffect>
+                                  </p:childTnLst>
+                                </p:cTn>
+                              </p:par>
+                            </p:childTnLst>
+                          </p:cTn>
+                        </p:par>
+                      </p:childTnLst>
+                    </p:cTn>
+                  </p:par>
+                  <p:par>
+                    <p:cTn id="13" fill="hold">
+                      <p:stCondLst>
+                        <p:cond delay="indefinite"/>
+                      </p:stCondLst>
+                      <p:childTnLst>
+                        <p:par>
+                          <p:cTn id="14" fill="hold">
+                            <p:stCondLst>
+                              <p:cond delay="0"/>
+                            </p:stCondLst>
+                            <p:childTnLst>
+                              <p:par>
+                                <p:cTn id="15" presetID="10" presetClass="entr" presetSubtype="0" fill="hold" nodeType="clickEffect">
+                                  <p:stCondLst>
+                                    <p:cond delay="0"/>
+                                  </p:stCondLst>
+                                  <p:childTnLst>
+                                    <p:set>
+                                      <p:cBhvr>
+                                        <p:cTn id="16" dur="1" fill="hold">
+                                          <p:stCondLst>
+                                            <p:cond delay="0"/>
+                                          </p:stCondLst>
+                                        </p:cTn>
+                                        <p:tgtEl>
+                                          <p:spTgt spid="9">
+                                            <p:txEl>
+                                              <p:pRg st="2" end="2"/>
+                                            </p:txEl>
+                                          </p:spTgt>
+                                        </p:tgtEl>
+                                        <p:attrNameLst>
+                                          <p:attrName>style.visibility</p:attrName>
+                                        </p:attrNameLst>
+                                      </p:cBhvr>
+                                      <p:to>
+                                        <p:strVal val="visible"/>
+                                      </p:to>
+                                    </p:set>
+                                    <p:animEffect transition="in" filter="fade">
+                                      <p:cBhvr>
+                                        <p:cTn id="17" dur="500"/>
+                                        <p:tgtEl>
+                                          <p:spTgt spid="9">
+                                            <p:txEl>
+                                              <p:pRg st="2" end="2"/>
+                                            </p:txEl>
+                                          </p:spTgt>
+                                        </p:tgtEl>
+                                      </p:cBhvr>
+                                    </p:animEffect>
+                                  </p:childTnLst>
+                                </p:cTn>
+                              </p:par>
+                            </p:childTnLst>
+                          </p:cTn>
+                        </p:par>
+                        <p:par>
+                          <p:cTn id="18" fill="hold">
+                            <p:stCondLst>
+                              <p:cond delay="500"/>
+                            </p:stCondLst>
+                            <p:childTnLst>
+                              <p:par>
+                                <p:cTn id="19" presetID="10" presetClass="entr" presetSubtype="0" fill="hold" nodeType="afterEffect">
+                                  <p:stCondLst>
+                                    <p:cond delay="0"/>
+                                  </p:stCondLst>
+                                  <p:childTnLst>
+                                    <p:set>
+                                      <p:cBhvr>
+                                        <p:cTn id="20" dur="1" fill="hold">
+                                          <p:stCondLst>
+                                            <p:cond delay="0"/>
+                                          </p:stCondLst>
+                                        </p:cTn>
+                                        <p:tgtEl>
+                                          <p:spTgt spid="9">
+                                            <p:txEl>
+                                              <p:pRg st="3" end="3"/>
+                                            </p:txEl>
+                                          </p:spTgt>
+                                        </p:tgtEl>
+                                        <p:attrNameLst>
+                                          <p:attrName>style.visibility</p:attrName>
+                                        </p:attrNameLst>
+                                      </p:cBhvr>
+                                      <p:to>
+                                        <p:strVal val="visible"/>
+                                      </p:to>
+                                    </p:set>
+                                    <p:animEffect transition="in" filter="fade">
+                                      <p:cBhvr>
+                                        <p:cTn id="21" dur="500"/>
+                                        <p:tgtEl>
+                                          <p:spTgt spid="9">
+                                            <p:txEl>
+                                              <p:pRg st="3" end="3"/>
+                                            </p:txEl>
+                                          </p:spTgt>
+                                        </p:tgtEl>
+                                      </p:cBhvr>
+                                    </p:animEffect>
+                                  </p:childTnLst>
+                                </p:cTn>
+                              </p:par>
+                            </p:childTnLst>
+                          </p:cTn>
+                        </p:par>
+                        <p:par>
+                          <p:cTn id="22" fill="hold">
+                            <p:stCondLst>
+                              <p:cond delay="1000"/>
+                            </p:stCondLst>
+                            <p:childTnLst>
+                              <p:par>
+                                <p:cTn id="23" presetID="10" presetClass="entr" presetSubtype="0" fill="hold" nodeType="afterEffect">
+                                  <p:stCondLst>
+                                    <p:cond delay="0"/>
+                                  </p:stCondLst>
+                                  <p:childTnLst>
+                                    <p:set>
+                                      <p:cBhvr>
+                                        <p:cTn id="24" dur="1" fill="hold">
+                                          <p:stCondLst>
+                                            <p:cond delay="0"/>
+                                          </p:stCondLst>
+                                        </p:cTn>
+                                        <p:tgtEl>
+                                          <p:spTgt spid="9">
+                                            <p:txEl>
+                                              <p:pRg st="4" end="4"/>
+                                            </p:txEl>
+                                          </p:spTgt>
+                                        </p:tgtEl>
+                                        <p:attrNameLst>
+                                          <p:attrName>style.visibility</p:attrName>
+                                        </p:attrNameLst>
+                                      </p:cBhvr>
+                                      <p:to>
+                                        <p:strVal val="visible"/>
+                                      </p:to>
+                                    </p:set>
+                                    <p:animEffect transition="in" filter="fade">
+                                      <p:cBhvr>
+                                        <p:cTn id="25" dur="500"/>
+                                        <p:tgtEl>
+                                          <p:spTgt spid="9">
+                                            <p:txEl>
+                                              <p:pRg st="4" end="4"/>
+                                            </p:txEl>
+                                          </p:spTgt>
+                                        </p:tgtEl>
+                                      </p:cBhvr>
+                                    </p:animEffect>
+                                  </p:childTnLst>
+                                </p:cTn>
+                              </p:par>
+                            </p:childTnLst>
+                          </p:cTn>
+                        </p:par>
+                      </p:childTnLst>
+                    </p:cTn>
+                  </p:par>
+                  <p:par>
+                    <p:cTn id="26" fill="hold">
+                      <p:stCondLst>
+                        <p:cond delay="indefinite"/>
+                      </p:stCondLst>
+                      <p:childTnLst>
+                        <p:par>
+                          <p:cTn id="27" fill="hold">
+                            <p:stCondLst>
+                              <p:cond delay="0"/>
+                            </p:stCondLst>
+                            <p:childTnLst>
+                              <p:par>
+                                <p:cTn id="28" presetID="10" presetClass="entr" presetSubtype="0" fill="hold" nodeType="clickEffect">
+                                  <p:stCondLst>
+                                    <p:cond delay="0"/>
+                                  </p:stCondLst>
+                                  <p:childTnLst>
+                                    <p:set>
+                                      <p:cBhvr>
+                                        <p:cTn id="29" dur="1" fill="hold">
+                                          <p:stCondLst>
+                                            <p:cond delay="0"/>
+                                          </p:stCondLst>
+                                        </p:cTn>
+                                        <p:tgtEl>
+                                          <p:spTgt spid="9">
+                                            <p:txEl>
+                                              <p:pRg st="5" end="5"/>
+                                            </p:txEl>
+                                          </p:spTgt>
+                                        </p:tgtEl>
+                                        <p:attrNameLst>
+                                          <p:attrName>style.visibility</p:attrName>
+                                        </p:attrNameLst>
+                                      </p:cBhvr>
+                                      <p:to>
+                                        <p:strVal val="visible"/>
+                                      </p:to>
+                                    </p:set>
+                                    <p:animEffect transition="in" filter="fade">
+                                      <p:cBhvr>
+                                        <p:cTn id="30" dur="500"/>
+                                        <p:tgtEl>
+                                          <p:spTgt spid="9">
+                                            <p:txEl>
+                                              <p:pRg st="5" end="5"/>
+                                            </p:txEl>
+                                          </p:spTgt>
+                                        </p:tgtEl>
+                                      </p:cBhvr>
+                                    </p:animEffect>
+                                  </p:childTnLst>
+                                </p:cTn>
+                              </p:par>
+                            </p:childTnLst>
+                          </p:cTn>
+                        </p:par>
+                        <p:par>
+                          <p:cTn id="31" fill="hold">
+                            <p:stCondLst>
+                              <p:cond delay="500"/>
+                            </p:stCondLst>
+                            <p:childTnLst>
+                              <p:par>
+                                <p:cTn id="32" presetID="10" presetClass="entr" presetSubtype="0" fill="hold" nodeType="afterEffect">
+                                  <p:stCondLst>
+                                    <p:cond delay="0"/>
+                                  </p:stCondLst>
+                                  <p:childTnLst>
+                                    <p:set>
+                                      <p:cBhvr>
+                                        <p:cTn id="33" dur="1" fill="hold">
+                                          <p:stCondLst>
+                                            <p:cond delay="0"/>
+                                          </p:stCondLst>
+                                        </p:cTn>
+                                        <p:tgtEl>
+                                          <p:spTgt spid="9">
+                                            <p:txEl>
+                                              <p:pRg st="6" end="6"/>
+                                            </p:txEl>
+                                          </p:spTgt>
+                                        </p:tgtEl>
+                                        <p:attrNameLst>
+                                          <p:attrName>style.visibility</p:attrName>
+                                        </p:attrNameLst>
+                                      </p:cBhvr>
+                                      <p:to>
+                                        <p:strVal val="visible"/>
+                                      </p:to>
+                                    </p:set>
+                                    <p:animEffect transition="in" filter="fade">
+                                      <p:cBhvr>
+                                        <p:cTn id="34" dur="500"/>
+                                        <p:tgtEl>
+                                          <p:spTgt spid="9">
+                                            <p:txEl>
+                                              <p:pRg st="6" end="6"/>
+                                            </p:txEl>
+                                          </p:spTgt>
+                                        </p:tgtEl>
+                                      </p:cBhvr>
+                                    </p:animEffect>
+                                  </p:childTnLst>
+                                </p:cTn>
+                              </p:par>
+                            </p:childTnLst>
+                          </p:cTn>
+                        </p:par>
+                        <p:par>
+                          <p:cTn id="35" fill="hold">
+                            <p:stCondLst>
+                              <p:cond delay="1000"/>
+                            </p:stCondLst>
+                            <p:childTnLst>
+                              <p:par>
+                                <p:cTn id="36" presetID="10" presetClass="entr" presetSubtype="0" fill="hold" nodeType="afterEffect">
+                                  <p:stCondLst>
+                                    <p:cond delay="0"/>
+                                  </p:stCondLst>
+                                  <p:childTnLst>
+                                    <p:set>
+                                      <p:cBhvr>
+                                        <p:cTn id="37" dur="1" fill="hold">
+                                          <p:stCondLst>
+                                            <p:cond delay="0"/>
+                                          </p:stCondLst>
+                                        </p:cTn>
+                                        <p:tgtEl>
+                                          <p:spTgt spid="9">
+                                            <p:txEl>
+                                              <p:pRg st="7" end="7"/>
+                                            </p:txEl>
+                                          </p:spTgt>
+                                        </p:tgtEl>
+                                        <p:attrNameLst>
+                                          <p:attrName>style.visibility</p:attrName>
+                                        </p:attrNameLst>
+                                      </p:cBhvr>
+                                      <p:to>
+                                        <p:strVal val="visible"/>
+                                      </p:to>
+                                    </p:set>
+                                    <p:animEffect transition="in" filter="fade">
+                                      <p:cBhvr>
+                                        <p:cTn id="38" dur="500"/>
+                                        <p:tgtEl>
+                                          <p:spTgt spid="9">
+                                            <p:txEl>
+                                              <p:pRg st="7" end="7"/>
+                                            </p:txEl>
+                                          </p:spTgt>
+                                        </p:tgtEl>
+                                      </p:cBhvr>
+                                    </p:animEffect>
+                                  </p:childTnLst>
+                                </p:cTn>
+                              </p:par>
+                            </p:childTnLst>
+                          </p:cTn>
+                        </p:par>
+                        <p:par>
+                          <p:cTn id="39" fill="hold">
+                            <p:stCondLst>
+                              <p:cond delay="1500"/>
+                            </p:stCondLst>
+                            <p:childTnLst>
+                              <p:par>
+                                <p:cTn id="40" presetID="10" presetClass="entr" presetSubtype="0" fill="hold" nodeType="afterEffect">
+                                  <p:stCondLst>
+                                    <p:cond delay="0"/>
+                                  </p:stCondLst>
+                                  <p:childTnLst>
+                                    <p:set>
+                                      <p:cBhvr>
+                                        <p:cTn id="41" dur="1" fill="hold">
+                                          <p:stCondLst>
+                                            <p:cond delay="0"/>
+                                          </p:stCondLst>
+                                        </p:cTn>
+                                        <p:tgtEl>
+                                          <p:spTgt spid="9">
+                                            <p:txEl>
+                                              <p:pRg st="8" end="8"/>
+                                            </p:txEl>
+                                          </p:spTgt>
+                                        </p:tgtEl>
+                                        <p:attrNameLst>
+                                          <p:attrName>style.visibility</p:attrName>
+                                        </p:attrNameLst>
+                                      </p:cBhvr>
+                                      <p:to>
+                                        <p:strVal val="visible"/>
+                                      </p:to>
+                                    </p:set>
+                                    <p:animEffect transition="in" filter="fade">
+                                      <p:cBhvr>
+                                        <p:cTn id="42" dur="500"/>
+                                        <p:tgtEl>
+                                          <p:spTgt spid="9">
+                                            <p:txEl>
+                                              <p:pRg st="8" end="8"/>
+                                            </p:txEl>
+                                          </p:spTgt>
+                                        </p:tgtEl>
+                                      </p:cBhvr>
+                                    </p:animEffect>
+                                  </p:childTnLst>
+                                </p:cTn>
+                              </p:par>
+                            </p:childTnLst>
+                          </p:cTn>
+                        </p:par>
+                        <p:par>
+                          <p:cTn id="43" fill="hold">
+                            <p:stCondLst>
+                              <p:cond delay="2000"/>
+                            </p:stCondLst>
+                            <p:childTnLst>
+                              <p:par>
+                                <p:cTn id="44" presetID="10" presetClass="entr" presetSubtype="0" fill="hold" nodeType="afterEffect">
+                                  <p:stCondLst>
+                                    <p:cond delay="0"/>
+                                  </p:stCondLst>
+                                  <p:childTnLst>
+                                    <p:set>
+                                      <p:cBhvr>
+                                        <p:cTn id="45" dur="1" fill="hold">
+                                          <p:stCondLst>
+                                            <p:cond delay="0"/>
+                                          </p:stCondLst>
+                                        </p:cTn>
+                                        <p:tgtEl>
+                                          <p:spTgt spid="9">
+                                            <p:txEl>
+                                              <p:pRg st="10" end="10"/>
+                                            </p:txEl>
+                                          </p:spTgt>
+                                        </p:tgtEl>
+                                        <p:attrNameLst>
+                                          <p:attrName>style.visibility</p:attrName>
+                                        </p:attrNameLst>
+                                      </p:cBhvr>
+                                      <p:to>
+                                        <p:strVal val="visible"/>
+                                      </p:to>
+                                    </p:set>
+                                    <p:animEffect transition="in" filter="fade">
+                                      <p:cBhvr>
+                                        <p:cTn id="46" dur="500"/>
+                                        <p:tgtEl>
+                                          <p:spTgt spid="9">
+                                            <p:txEl>
+                                              <p:pRg st="10" end="10"/>
+                                            </p:txEl>
+                                          </p:spTgt>
+                                        </p:tgtEl>
+                                      </p:cBhvr>
+                                    </p:animEffect>
+                                  </p:childTnLst>
+                                </p:cTn>
+                              </p:par>
+                            </p:childTnLst>
+                          </p:cTn>
+                        </p:par>
+                      </p:childTnLst>
+                    </p:cTn>
+                  </p:par>
+                </p:childTnLst>
+              </p:cTn>
+              <p:prevCondLst>
+                <p:cond evt="onPrev" delay="0">
+                  <p:tgtEl>
+                    <p:sldTgt/>
+                  </p:tgtEl>
+                </p:cond>
+              </p:prevCondLst>
+              <p:nextCondLst>
+                <p:cond evt="onNext" delay="0">
+                  <p:tgtEl>
+                    <p:sldTgt/>
+                  </p:tgtEl>
+                </p:cond>
+              </p:nextCondLst>
+            </p:seq>
+          </p:childTnLst>
+        </p:cTn>
+      </p:par>
+    </p:tnLst>
+  </p:timing>
+</p:sld>
+</file>
+
+<file path=ppt/slides/slide15.xml><?xml version="1.0" encoding="utf-8"?>
+<p:sld xmlns:a="http://schemas.openxmlformats.org/drawingml/2006/main" xmlns:r="http://schemas.openxmlformats.org/officeDocument/2006/relationships" xmlns:p="http://schemas.openxmlformats.org/presentationml/2006/main">
+  <p:cSld>
+    <p:spTree>
+      <p:nvGrpSpPr>
+        <p:cNvPr id="1" name=""/>
+        <p:cNvGrpSpPr/>
+        <p:nvPr/>
+      </p:nvGrpSpPr>
+      <p:grpSpPr>
+        <a:xfrm>
+          <a:off x="0" y="0"/>
+          <a:ext cx="0" cy="0"/>
+          <a:chOff x="0" y="0"/>
+          <a:chExt cx="0" cy="0"/>
+        </a:xfrm>
+      </p:grpSpPr>
+      <p:pic>
+        <p:nvPicPr>
+          <p:cNvPr id="8" name="Afbeelding 7"/>
+          <p:cNvPicPr>
+            <a:picLocks noChangeAspect="1"/>
+          </p:cNvPicPr>
+          <p:nvPr/>
+        </p:nvPicPr>
+        <p:blipFill>
+          <a:blip r:embed="rId3">
+            <a:alphaModFix/>
+            <a:lum bright="70000" contrast="-70000"/>
+          </a:blip>
+          <a:srcRect/>
+          <a:stretch>
+            <a:fillRect/>
+          </a:stretch>
+        </p:blipFill>
+        <p:spPr>
+          <a:xfrm>
+            <a:off x="5044603" y="3561971"/>
+            <a:ext cx="5520916" cy="4036695"/>
+          </a:xfrm>
+          <a:prstGeom prst="rect">
+            <a:avLst/>
+          </a:prstGeom>
+          <a:noFill/>
+          <a:ln>
+            <a:noFill/>
+          </a:ln>
+        </p:spPr>
+      </p:pic>
+      <p:sp>
+        <p:nvSpPr>
+          <p:cNvPr id="6" name="Titel 7"/>
+          <p:cNvSpPr txBox="1">
+            <a:spLocks/>
+          </p:cNvSpPr>
+          <p:nvPr/>
+        </p:nvSpPr>
+        <p:spPr>
+          <a:xfrm>
+            <a:off x="503280" y="300960"/>
+            <a:ext cx="9068760" cy="1262520"/>
+          </a:xfrm>
+          <a:prstGeom prst="rect">
+            <a:avLst/>
+          </a:prstGeom>
+        </p:spPr>
+        <p:txBody>
+          <a:bodyPr anchor="t"/>
+          <a:lstStyle>
+            <a:lvl1pPr algn="ctr" rtl="0" hangingPunct="0">
+              <a:tabLst/>
+              <a:defRPr lang="en-US" sz="4400" b="0" i="0" u="none" strike="noStrike" kern="1200">
+                <a:ln>
+                  <a:noFill/>
+                </a:ln>
+                <a:latin typeface="Arial" pitchFamily="18"/>
+              </a:defRPr>
+            </a:lvl1pPr>
+          </a:lstStyle>
+          <a:p>
+            <a:pPr>
+              <a:tabLst>
+                <a:tab pos="9053513" algn="r"/>
+              </a:tabLst>
+            </a:pPr>
+            <a:r>
+              <a:rPr lang="nl-BE" sz="5400" dirty="0" err="1" smtClean="0">
+                <a:solidFill>
+                  <a:schemeClr val="tx1">
+                    <a:lumMod val="50000"/>
+                    <a:lumOff val="50000"/>
+                  </a:schemeClr>
+                </a:solidFill>
+                <a:latin typeface="Impact" pitchFamily="34"/>
+                <a:ea typeface="WenQuanYi Micro Hei" pitchFamily="2"/>
+                <a:cs typeface="Lohit Hindi" pitchFamily="2"/>
+              </a:rPr>
+              <a:t>Ro-Bomberman</a:t>
+            </a:r>
+            <a:r>
+              <a:rPr lang="nl-BE" dirty="0" smtClean="0"/>
+              <a:t>	</a:t>
+            </a:r>
+            <a:r>
+              <a:rPr lang="nl-BE" sz="3200" dirty="0" smtClean="0">
+                <a:solidFill>
+                  <a:schemeClr val="tx1">
+                    <a:lumMod val="65000"/>
+                    <a:lumOff val="35000"/>
+                  </a:schemeClr>
+                </a:solidFill>
+                <a:latin typeface="Impact" pitchFamily="34"/>
+              </a:rPr>
+              <a:t>Spel</a:t>
+            </a:r>
+            <a:endParaRPr lang="nl-BE" sz="3200" dirty="0">
+              <a:solidFill>
+                <a:schemeClr val="tx1">
+                  <a:lumMod val="65000"/>
+                  <a:lumOff val="35000"/>
+                </a:schemeClr>
+              </a:solidFill>
+              <a:latin typeface="Impact" pitchFamily="34"/>
+              <a:ea typeface="WenQuanYi Micro Hei" pitchFamily="2"/>
+              <a:cs typeface="Lohit Hindi" pitchFamily="2"/>
+            </a:endParaRPr>
+          </a:p>
+        </p:txBody>
+      </p:sp>
+      <p:sp>
+        <p:nvSpPr>
+          <p:cNvPr id="7" name="Tekstvak 6"/>
+          <p:cNvSpPr txBox="1"/>
+          <p:nvPr/>
+        </p:nvSpPr>
+        <p:spPr>
+          <a:xfrm>
+            <a:off x="18720" y="7240320"/>
+            <a:ext cx="10051767" cy="282598"/>
+          </a:xfrm>
+          <a:prstGeom prst="rect">
+            <a:avLst/>
+          </a:prstGeom>
+          <a:noFill/>
+          <a:ln>
+            <a:noFill/>
+          </a:ln>
+        </p:spPr>
+        <p:txBody>
+          <a:bodyPr vert="horz" wrap="none" lIns="90000" tIns="45000" rIns="90000" bIns="45000" anchorCtr="0" compatLnSpc="0">
+            <a:spAutoFit/>
+          </a:bodyPr>
+          <a:lstStyle/>
+          <a:p>
+            <a:pPr marL="0" marR="0" lvl="0" indent="0" rtl="0" hangingPunct="0">
+              <a:lnSpc>
+                <a:spcPct val="100000"/>
+              </a:lnSpc>
+              <a:spcBef>
+                <a:spcPts val="0"/>
+              </a:spcBef>
+              <a:spcAft>
+                <a:spcPts val="0"/>
+              </a:spcAft>
+              <a:buNone/>
+              <a:tabLst>
+                <a:tab pos="4932363" algn="ctr"/>
+                <a:tab pos="9774238" algn="r"/>
+                <a:tab pos="11072813" algn="l"/>
+              </a:tabLst>
+              <a:defRPr sz="1800">
+                <a:solidFill>
+                  <a:srgbClr val="999999"/>
+                </a:solidFill>
+              </a:defRPr>
+            </a:pPr>
+            <a:r>
+              <a:rPr lang="en-US" sz="1300" b="0" i="0" u="none" strike="noStrike" kern="1200" dirty="0" err="1">
+                <a:ln>
+                  <a:noFill/>
+                </a:ln>
+                <a:solidFill>
+                  <a:srgbClr val="999999"/>
+                </a:solidFill>
+                <a:latin typeface="Arial" pitchFamily="18"/>
+                <a:ea typeface="WenQuanYi Micro Hei" pitchFamily="2"/>
+                <a:cs typeface="Lohit Hindi" pitchFamily="2"/>
+              </a:rPr>
+              <a:t>KULeuven</a:t>
+            </a:r>
+            <a:r>
+              <a:rPr lang="en-US" sz="1300" b="0" i="0" u="none" strike="noStrike" kern="1200" dirty="0">
+                <a:ln>
+                  <a:noFill/>
+                </a:ln>
+                <a:solidFill>
+                  <a:srgbClr val="999999"/>
+                </a:solidFill>
+                <a:latin typeface="Arial" pitchFamily="18"/>
+                <a:ea typeface="WenQuanYi Micro Hei" pitchFamily="2"/>
+                <a:cs typeface="Lohit Hindi" pitchFamily="2"/>
+              </a:rPr>
+              <a:t> 2012-2013	</a:t>
+            </a:r>
+            <a:r>
+              <a:rPr lang="en-US" sz="1300" b="0" i="0" u="none" strike="noStrike" kern="1200" dirty="0" smtClean="0">
+                <a:ln>
+                  <a:noFill/>
+                </a:ln>
+                <a:solidFill>
+                  <a:srgbClr val="999999"/>
+                </a:solidFill>
+                <a:latin typeface="Arial" pitchFamily="18"/>
+                <a:ea typeface="WenQuanYi Micro Hei" pitchFamily="2"/>
+                <a:cs typeface="Lohit Hindi" pitchFamily="2"/>
+              </a:rPr>
+              <a:t>P&amp;O </a:t>
+            </a:r>
+            <a:r>
+              <a:rPr lang="en-US" sz="1300" b="0" i="0" u="none" strike="noStrike" kern="1200" dirty="0" err="1">
+                <a:ln>
+                  <a:noFill/>
+                </a:ln>
+                <a:solidFill>
+                  <a:srgbClr val="999999"/>
+                </a:solidFill>
+                <a:latin typeface="Arial" pitchFamily="18"/>
+                <a:ea typeface="WenQuanYi Micro Hei" pitchFamily="2"/>
+                <a:cs typeface="Lohit Hindi" pitchFamily="2"/>
+              </a:rPr>
+              <a:t>Computerwetenschappen</a:t>
+            </a:r>
+            <a:r>
+              <a:rPr lang="en-US" sz="1300" b="0" i="0" u="none" strike="noStrike" kern="1200" dirty="0">
+                <a:ln>
+                  <a:noFill/>
+                </a:ln>
+                <a:solidFill>
+                  <a:srgbClr val="999999"/>
+                </a:solidFill>
+                <a:latin typeface="Arial" pitchFamily="18"/>
+                <a:ea typeface="WenQuanYi Micro Hei" pitchFamily="2"/>
+                <a:cs typeface="Lohit Hindi" pitchFamily="2"/>
+              </a:rPr>
+              <a:t> - Team </a:t>
+            </a:r>
+            <a:r>
+              <a:rPr lang="en-US" sz="1300" b="0" i="0" u="none" strike="noStrike" kern="1200" dirty="0" err="1" smtClean="0">
+                <a:ln>
+                  <a:noFill/>
+                </a:ln>
+                <a:solidFill>
+                  <a:srgbClr val="999999"/>
+                </a:solidFill>
+                <a:latin typeface="Arial" pitchFamily="18"/>
+                <a:ea typeface="WenQuanYi Micro Hei" pitchFamily="2"/>
+                <a:cs typeface="Lohit Hindi" pitchFamily="2"/>
+              </a:rPr>
+              <a:t>Zilver</a:t>
+            </a:r>
+            <a:r>
+              <a:rPr lang="en-US" sz="1300" dirty="0" smtClean="0">
+                <a:solidFill>
+                  <a:srgbClr val="999999"/>
+                </a:solidFill>
+                <a:latin typeface="Arial" pitchFamily="18"/>
+                <a:ea typeface="WenQuanYi Micro Hei" pitchFamily="2"/>
+                <a:cs typeface="Lohit Hindi" pitchFamily="2"/>
+              </a:rPr>
+              <a:t>	</a:t>
+            </a:r>
+            <a:fld id="{01643B32-A42A-4810-B4D4-9049586A656C}" type="slidenum">
+              <a:rPr lang="en-US" sz="1300" smtClean="0">
+                <a:solidFill>
+                  <a:srgbClr val="999999"/>
+                </a:solidFill>
+                <a:latin typeface="Arial" pitchFamily="18"/>
+                <a:ea typeface="WenQuanYi Micro Hei" pitchFamily="2"/>
+                <a:cs typeface="Lohit Hindi" pitchFamily="2"/>
+              </a:rPr>
+              <a:pPr marL="0" marR="0" lvl="0" indent="0" rtl="0" hangingPunct="0">
+                <a:lnSpc>
+                  <a:spcPct val="100000"/>
+                </a:lnSpc>
+                <a:spcBef>
+                  <a:spcPts val="0"/>
+                </a:spcBef>
+                <a:spcAft>
+                  <a:spcPts val="0"/>
+                </a:spcAft>
+                <a:buNone/>
+                <a:tabLst>
+                  <a:tab pos="4932363" algn="ctr"/>
+                  <a:tab pos="9774238" algn="r"/>
+                  <a:tab pos="11072813" algn="l"/>
+                </a:tabLst>
+                <a:defRPr sz="1800">
+                  <a:solidFill>
+                    <a:srgbClr val="999999"/>
+                  </a:solidFill>
+                </a:defRPr>
+              </a:pPr>
+              <a:t>15</a:t>
+            </a:fld>
+            <a:endParaRPr lang="en-US" sz="1300" b="0" i="0" u="none" strike="noStrike" kern="1200" dirty="0">
+              <a:ln>
+                <a:noFill/>
+              </a:ln>
+              <a:solidFill>
+                <a:srgbClr val="999999"/>
+              </a:solidFill>
+              <a:latin typeface="Arial" pitchFamily="18"/>
+              <a:ea typeface="WenQuanYi Micro Hei" pitchFamily="2"/>
+              <a:cs typeface="Lohit Hindi" pitchFamily="2"/>
+            </a:endParaRPr>
+          </a:p>
+        </p:txBody>
+      </p:sp>
+      <p:pic>
+        <p:nvPicPr>
+          <p:cNvPr id="1026" name="Picture 2" descr="D:\Scripts\GIT\SilverSurfer\SilverSurferVerslag\Verslag Eindverslag\bomberman.png"/>
+          <p:cNvPicPr>
+            <a:picLocks noChangeAspect="1" noChangeArrowheads="1"/>
+          </p:cNvPicPr>
+          <p:nvPr/>
+        </p:nvPicPr>
+        <p:blipFill>
+          <a:blip r:embed="rId4">
+            <a:extLst>
+              <a:ext uri="{28A0092B-C50C-407E-A947-70E740481C1C}">
+                <a14:useLocalDpi xmlns:a14="http://schemas.microsoft.com/office/drawing/2010/main" val="0"/>
+              </a:ext>
+            </a:extLst>
+          </a:blip>
+          <a:srcRect/>
+          <a:stretch>
+            <a:fillRect/>
+          </a:stretch>
+        </p:blipFill>
+        <p:spPr bwMode="auto">
+          <a:xfrm>
+            <a:off x="681817" y="1563480"/>
+            <a:ext cx="5509036" cy="4491382"/>
+          </a:xfrm>
+          <a:prstGeom prst="rect">
+            <a:avLst/>
+          </a:prstGeom>
+          <a:noFill/>
+          <a:extLst>
+            <a:ext uri="{909E8E84-426E-40DD-AFC4-6F175D3DCCD1}">
+              <a14:hiddenFill xmlns:a14="http://schemas.microsoft.com/office/drawing/2010/main">
+                <a:solidFill>
+                  <a:srgbClr val="FFFFFF"/>
+                </a:solidFill>
+              </a14:hiddenFill>
+            </a:ext>
+          </a:extLst>
+        </p:spPr>
+      </p:pic>
+    </p:spTree>
+    <p:extLst>
+      <p:ext uri="{BB962C8B-B14F-4D97-AF65-F5344CB8AC3E}">
+        <p14:creationId xmlns:p14="http://schemas.microsoft.com/office/powerpoint/2010/main" val="20845965"/>
+      </p:ext>
+    </p:extLst>
+  </p:cSld>
+  <p:clrMapOvr>
+    <a:masterClrMapping/>
+  </p:clrMapOvr>
+  <mc:AlternateContent xmlns:mc="http://schemas.openxmlformats.org/markup-compatibility/2006" xmlns:p14="http://schemas.microsoft.com/office/powerpoint/2010/main">
+    <mc:Choice Requires="p14">
+      <p:transition spd="med" p14:dur="700">
+        <p:fade/>
+      </p:transition>
+    </mc:Choice>
+    <mc:Fallback xmlns="">
+      <p:transition spd="med">
+        <p:fade/>
+      </p:transition>
+    </mc:Fallback>
+  </mc:AlternateContent>
+  <p:timing>
+    <p:tnLst>
+      <p:par>
+        <p:cTn id="1" dur="indefinite" restart="never" nodeType="tmRoot"/>
+      </p:par>
+    </p:tnLst>
+  </p:timing>
+</p:sld>
+</file>
+
+<file path=ppt/slides/slide16.xml><?xml version="1.0" encoding="utf-8"?>
+<p:sld xmlns:a="http://schemas.openxmlformats.org/drawingml/2006/main" xmlns:r="http://schemas.openxmlformats.org/officeDocument/2006/relationships" xmlns:p="http://schemas.openxmlformats.org/presentationml/2006/main">
+  <p:cSld>
+    <p:spTree>
+      <p:nvGrpSpPr>
+        <p:cNvPr id="1" name=""/>
+        <p:cNvGrpSpPr/>
+        <p:nvPr/>
+      </p:nvGrpSpPr>
+      <p:grpSpPr>
+        <a:xfrm>
+          <a:off x="0" y="0"/>
+          <a:ext cx="0" cy="0"/>
+          <a:chOff x="0" y="0"/>
+          <a:chExt cx="0" cy="0"/>
+        </a:xfrm>
+      </p:grpSpPr>
+      <p:pic>
+        <p:nvPicPr>
+          <p:cNvPr id="8" name="Afbeelding 7"/>
+          <p:cNvPicPr>
+            <a:picLocks noChangeAspect="1"/>
+          </p:cNvPicPr>
+          <p:nvPr/>
+        </p:nvPicPr>
+        <p:blipFill>
+          <a:blip r:embed="rId3">
+            <a:alphaModFix/>
+            <a:lum bright="70000" contrast="-70000"/>
+          </a:blip>
+          <a:srcRect/>
+          <a:stretch>
+            <a:fillRect/>
+          </a:stretch>
+        </p:blipFill>
+        <p:spPr>
+          <a:xfrm>
+            <a:off x="5044603" y="3561971"/>
+            <a:ext cx="5520916" cy="4036695"/>
+          </a:xfrm>
+          <a:prstGeom prst="rect">
+            <a:avLst/>
+          </a:prstGeom>
+          <a:noFill/>
+          <a:ln>
+            <a:noFill/>
+          </a:ln>
+        </p:spPr>
+      </p:pic>
+      <p:sp>
+        <p:nvSpPr>
+          <p:cNvPr id="6" name="Titel 7"/>
+          <p:cNvSpPr txBox="1">
+            <a:spLocks/>
+          </p:cNvSpPr>
+          <p:nvPr/>
+        </p:nvSpPr>
+        <p:spPr>
+          <a:xfrm>
+            <a:off x="503280" y="300960"/>
+            <a:ext cx="9068760" cy="1262520"/>
+          </a:xfrm>
+          <a:prstGeom prst="rect">
+            <a:avLst/>
+          </a:prstGeom>
+        </p:spPr>
+        <p:txBody>
+          <a:bodyPr anchor="t"/>
+          <a:lstStyle>
+            <a:lvl1pPr algn="ctr" rtl="0" hangingPunct="0">
+              <a:tabLst/>
+              <a:defRPr lang="en-US" sz="4400" b="0" i="0" u="none" strike="noStrike" kern="1200">
+                <a:ln>
+                  <a:noFill/>
+                </a:ln>
+                <a:latin typeface="Arial" pitchFamily="18"/>
+              </a:defRPr>
+            </a:lvl1pPr>
+          </a:lstStyle>
+          <a:p>
+            <a:pPr>
+              <a:tabLst>
+                <a:tab pos="9053513" algn="r"/>
+              </a:tabLst>
+            </a:pPr>
+            <a:r>
+              <a:rPr lang="nl-BE" sz="5400" dirty="0" err="1" smtClean="0">
+                <a:solidFill>
+                  <a:schemeClr val="tx1">
+                    <a:lumMod val="50000"/>
+                    <a:lumOff val="50000"/>
+                  </a:schemeClr>
+                </a:solidFill>
+                <a:latin typeface="Impact" pitchFamily="34"/>
+                <a:ea typeface="WenQuanYi Micro Hei" pitchFamily="2"/>
+                <a:cs typeface="Lohit Hindi" pitchFamily="2"/>
+              </a:rPr>
+              <a:t>Ro-Bomberman</a:t>
+            </a:r>
+            <a:r>
+              <a:rPr lang="nl-BE" dirty="0" smtClean="0"/>
+              <a:t>	</a:t>
+            </a:r>
+            <a:r>
+              <a:rPr lang="nl-BE" sz="3200" dirty="0" smtClean="0">
+                <a:solidFill>
+                  <a:schemeClr val="tx1">
+                    <a:lumMod val="65000"/>
+                    <a:lumOff val="35000"/>
+                  </a:schemeClr>
+                </a:solidFill>
+                <a:latin typeface="Impact" pitchFamily="34"/>
+              </a:rPr>
+              <a:t>Opdracht</a:t>
+            </a:r>
+            <a:endParaRPr lang="nl-BE" sz="3200" dirty="0">
+              <a:solidFill>
+                <a:schemeClr val="tx1">
+                  <a:lumMod val="65000"/>
+                  <a:lumOff val="35000"/>
+                </a:schemeClr>
+              </a:solidFill>
+              <a:latin typeface="Impact" pitchFamily="34"/>
+              <a:ea typeface="WenQuanYi Micro Hei" pitchFamily="2"/>
+              <a:cs typeface="Lohit Hindi" pitchFamily="2"/>
+            </a:endParaRPr>
+          </a:p>
+        </p:txBody>
+      </p:sp>
+      <p:sp>
+        <p:nvSpPr>
+          <p:cNvPr id="7" name="Tekstvak 6"/>
+          <p:cNvSpPr txBox="1"/>
+          <p:nvPr/>
+        </p:nvSpPr>
+        <p:spPr>
+          <a:xfrm>
+            <a:off x="18720" y="7240320"/>
+            <a:ext cx="10051767" cy="282598"/>
+          </a:xfrm>
+          <a:prstGeom prst="rect">
+            <a:avLst/>
+          </a:prstGeom>
+          <a:noFill/>
+          <a:ln>
+            <a:noFill/>
+          </a:ln>
+        </p:spPr>
+        <p:txBody>
+          <a:bodyPr vert="horz" wrap="none" lIns="90000" tIns="45000" rIns="90000" bIns="45000" anchorCtr="0" compatLnSpc="0">
+            <a:spAutoFit/>
+          </a:bodyPr>
+          <a:lstStyle/>
+          <a:p>
+            <a:pPr marL="0" marR="0" lvl="0" indent="0" rtl="0" hangingPunct="0">
+              <a:lnSpc>
+                <a:spcPct val="100000"/>
+              </a:lnSpc>
+              <a:spcBef>
+                <a:spcPts val="0"/>
+              </a:spcBef>
+              <a:spcAft>
+                <a:spcPts val="0"/>
+              </a:spcAft>
+              <a:buNone/>
+              <a:tabLst>
+                <a:tab pos="4932363" algn="ctr"/>
+                <a:tab pos="9774238" algn="r"/>
+                <a:tab pos="11072813" algn="l"/>
+              </a:tabLst>
+              <a:defRPr sz="1800">
+                <a:solidFill>
+                  <a:srgbClr val="999999"/>
+                </a:solidFill>
+              </a:defRPr>
+            </a:pPr>
+            <a:r>
+              <a:rPr lang="en-US" sz="1300" b="0" i="0" u="none" strike="noStrike" kern="1200" dirty="0" err="1">
+                <a:ln>
+                  <a:noFill/>
+                </a:ln>
+                <a:solidFill>
+                  <a:srgbClr val="999999"/>
+                </a:solidFill>
+                <a:latin typeface="Arial" pitchFamily="18"/>
+                <a:ea typeface="WenQuanYi Micro Hei" pitchFamily="2"/>
+                <a:cs typeface="Lohit Hindi" pitchFamily="2"/>
+              </a:rPr>
+              <a:t>KULeuven</a:t>
+            </a:r>
+            <a:r>
+              <a:rPr lang="en-US" sz="1300" b="0" i="0" u="none" strike="noStrike" kern="1200" dirty="0">
+                <a:ln>
+                  <a:noFill/>
+                </a:ln>
+                <a:solidFill>
+                  <a:srgbClr val="999999"/>
+                </a:solidFill>
+                <a:latin typeface="Arial" pitchFamily="18"/>
+                <a:ea typeface="WenQuanYi Micro Hei" pitchFamily="2"/>
+                <a:cs typeface="Lohit Hindi" pitchFamily="2"/>
+              </a:rPr>
+              <a:t> 2012-2013	</a:t>
+            </a:r>
+            <a:r>
+              <a:rPr lang="en-US" sz="1300" b="0" i="0" u="none" strike="noStrike" kern="1200" dirty="0" smtClean="0">
+                <a:ln>
+                  <a:noFill/>
+                </a:ln>
+                <a:solidFill>
+                  <a:srgbClr val="999999"/>
+                </a:solidFill>
+                <a:latin typeface="Arial" pitchFamily="18"/>
+                <a:ea typeface="WenQuanYi Micro Hei" pitchFamily="2"/>
+                <a:cs typeface="Lohit Hindi" pitchFamily="2"/>
+              </a:rPr>
+              <a:t>P&amp;O </a:t>
+            </a:r>
+            <a:r>
+              <a:rPr lang="en-US" sz="1300" b="0" i="0" u="none" strike="noStrike" kern="1200" dirty="0" err="1">
+                <a:ln>
+                  <a:noFill/>
+                </a:ln>
+                <a:solidFill>
+                  <a:srgbClr val="999999"/>
+                </a:solidFill>
+                <a:latin typeface="Arial" pitchFamily="18"/>
+                <a:ea typeface="WenQuanYi Micro Hei" pitchFamily="2"/>
+                <a:cs typeface="Lohit Hindi" pitchFamily="2"/>
+              </a:rPr>
+              <a:t>Computerwetenschappen</a:t>
+            </a:r>
+            <a:r>
+              <a:rPr lang="en-US" sz="1300" b="0" i="0" u="none" strike="noStrike" kern="1200" dirty="0">
+                <a:ln>
+                  <a:noFill/>
+                </a:ln>
+                <a:solidFill>
+                  <a:srgbClr val="999999"/>
+                </a:solidFill>
+                <a:latin typeface="Arial" pitchFamily="18"/>
+                <a:ea typeface="WenQuanYi Micro Hei" pitchFamily="2"/>
+                <a:cs typeface="Lohit Hindi" pitchFamily="2"/>
+              </a:rPr>
+              <a:t> - Team </a:t>
+            </a:r>
+            <a:r>
+              <a:rPr lang="en-US" sz="1300" b="0" i="0" u="none" strike="noStrike" kern="1200" dirty="0" err="1" smtClean="0">
+                <a:ln>
+                  <a:noFill/>
+                </a:ln>
+                <a:solidFill>
+                  <a:srgbClr val="999999"/>
+                </a:solidFill>
+                <a:latin typeface="Arial" pitchFamily="18"/>
+                <a:ea typeface="WenQuanYi Micro Hei" pitchFamily="2"/>
+                <a:cs typeface="Lohit Hindi" pitchFamily="2"/>
+              </a:rPr>
+              <a:t>Zilver</a:t>
+            </a:r>
+            <a:r>
+              <a:rPr lang="en-US" sz="1300" dirty="0" smtClean="0">
+                <a:solidFill>
+                  <a:srgbClr val="999999"/>
+                </a:solidFill>
+                <a:latin typeface="Arial" pitchFamily="18"/>
+                <a:ea typeface="WenQuanYi Micro Hei" pitchFamily="2"/>
+                <a:cs typeface="Lohit Hindi" pitchFamily="2"/>
+              </a:rPr>
+              <a:t>	</a:t>
+            </a:r>
+            <a:fld id="{01643B32-A42A-4810-B4D4-9049586A656C}" type="slidenum">
+              <a:rPr lang="en-US" sz="1300" smtClean="0">
+                <a:solidFill>
+                  <a:srgbClr val="999999"/>
+                </a:solidFill>
+                <a:latin typeface="Arial" pitchFamily="18"/>
+                <a:ea typeface="WenQuanYi Micro Hei" pitchFamily="2"/>
+                <a:cs typeface="Lohit Hindi" pitchFamily="2"/>
+              </a:rPr>
+              <a:pPr marL="0" marR="0" lvl="0" indent="0" rtl="0" hangingPunct="0">
+                <a:lnSpc>
+                  <a:spcPct val="100000"/>
+                </a:lnSpc>
+                <a:spcBef>
+                  <a:spcPts val="0"/>
+                </a:spcBef>
+                <a:spcAft>
+                  <a:spcPts val="0"/>
+                </a:spcAft>
+                <a:buNone/>
+                <a:tabLst>
+                  <a:tab pos="4932363" algn="ctr"/>
+                  <a:tab pos="9774238" algn="r"/>
+                  <a:tab pos="11072813" algn="l"/>
+                </a:tabLst>
+                <a:defRPr sz="1800">
+                  <a:solidFill>
+                    <a:srgbClr val="999999"/>
+                  </a:solidFill>
+                </a:defRPr>
+              </a:pPr>
+              <a:t>16</a:t>
+            </a:fld>
+            <a:endParaRPr lang="en-US" sz="1300" b="0" i="0" u="none" strike="noStrike" kern="1200" dirty="0">
+              <a:ln>
+                <a:noFill/>
+              </a:ln>
+              <a:solidFill>
+                <a:srgbClr val="999999"/>
+              </a:solidFill>
+              <a:latin typeface="Arial" pitchFamily="18"/>
+              <a:ea typeface="WenQuanYi Micro Hei" pitchFamily="2"/>
+              <a:cs typeface="Lohit Hindi" pitchFamily="2"/>
+            </a:endParaRPr>
+          </a:p>
+        </p:txBody>
+      </p:sp>
+      <p:sp>
+        <p:nvSpPr>
+          <p:cNvPr id="9" name="Tekstvak 8"/>
+          <p:cNvSpPr txBox="1"/>
+          <p:nvPr/>
+        </p:nvSpPr>
+        <p:spPr>
+          <a:xfrm>
+            <a:off x="731519" y="1828800"/>
+            <a:ext cx="5243309" cy="4868469"/>
+          </a:xfrm>
+          <a:prstGeom prst="rect">
+            <a:avLst/>
+          </a:prstGeom>
+          <a:noFill/>
+          <a:ln>
+            <a:noFill/>
+          </a:ln>
+        </p:spPr>
+        <p:txBody>
+          <a:bodyPr vert="horz" wrap="square" lIns="90000" tIns="45000" rIns="90000" bIns="45000" anchorCtr="0" compatLnSpc="0">
+            <a:spAutoFit/>
+          </a:bodyPr>
+          <a:lstStyle/>
+          <a:p>
+            <a:pPr marL="0" marR="0" lvl="0" indent="-457200" hangingPunct="0">
+              <a:lnSpc>
+                <a:spcPct val="100000"/>
+              </a:lnSpc>
+              <a:spcBef>
+                <a:spcPts val="0"/>
+              </a:spcBef>
+              <a:spcAft>
+                <a:spcPts val="0"/>
+              </a:spcAft>
+              <a:buSzPct val="80000"/>
+              <a:buFont typeface="Arial" pitchFamily="34" charset="0"/>
+              <a:buChar char="»"/>
+              <a:tabLst/>
+              <a:defRPr sz="1800"/>
+            </a:pPr>
+            <a:r>
+              <a:rPr lang="en-US" sz="2800" dirty="0" err="1" smtClean="0">
+                <a:latin typeface="Arial" pitchFamily="18"/>
+                <a:ea typeface="WenQuanYi Micro Hei" pitchFamily="2"/>
+                <a:cs typeface="Lohit Hindi" pitchFamily="2"/>
+              </a:rPr>
+              <a:t>Doel</a:t>
+            </a:r>
+            <a:endParaRPr lang="en-US" sz="2800" dirty="0">
+              <a:latin typeface="Arial" pitchFamily="18"/>
+              <a:ea typeface="WenQuanYi Micro Hei" pitchFamily="2"/>
+              <a:cs typeface="Lohit Hindi" pitchFamily="2"/>
+            </a:endParaRPr>
+          </a:p>
+          <a:p>
+            <a:pPr marL="914400" lvl="4" indent="-457200" hangingPunct="0">
+              <a:buSzPct val="80000"/>
+              <a:buFont typeface="Arial" pitchFamily="34" charset="0"/>
+              <a:buChar char="»"/>
+              <a:defRPr sz="1800"/>
+            </a:pPr>
+            <a:r>
+              <a:rPr lang="en-US" sz="2400" dirty="0" err="1" smtClean="0">
+                <a:latin typeface="Arial" pitchFamily="18"/>
+                <a:ea typeface="WenQuanYi Micro Hei" pitchFamily="2"/>
+                <a:cs typeface="Lohit Hindi" pitchFamily="2"/>
+              </a:rPr>
+              <a:t>Bomberman</a:t>
+            </a:r>
+            <a:r>
+              <a:rPr lang="en-US" sz="2400" dirty="0" smtClean="0">
+                <a:latin typeface="Arial" pitchFamily="18"/>
+                <a:ea typeface="WenQuanYi Micro Hei" pitchFamily="2"/>
+                <a:cs typeface="Lohit Hindi" pitchFamily="2"/>
+              </a:rPr>
+              <a:t> </a:t>
+            </a:r>
+            <a:r>
+              <a:rPr lang="en-US" sz="2400" dirty="0" err="1" smtClean="0">
+                <a:latin typeface="Arial" pitchFamily="18"/>
+                <a:ea typeface="WenQuanYi Micro Hei" pitchFamily="2"/>
+                <a:cs typeface="Lohit Hindi" pitchFamily="2"/>
+              </a:rPr>
+              <a:t>spelen</a:t>
+            </a:r>
+            <a:endParaRPr lang="en-US" sz="2400" dirty="0">
+              <a:latin typeface="Arial" pitchFamily="18"/>
+              <a:ea typeface="WenQuanYi Micro Hei" pitchFamily="2"/>
+              <a:cs typeface="Lohit Hindi" pitchFamily="2"/>
+            </a:endParaRPr>
+          </a:p>
+          <a:p>
+            <a:pPr marL="0" marR="0" lvl="2" indent="-457200" hangingPunct="0">
+              <a:lnSpc>
+                <a:spcPct val="100000"/>
+              </a:lnSpc>
+              <a:spcBef>
+                <a:spcPts val="0"/>
+              </a:spcBef>
+              <a:spcAft>
+                <a:spcPts val="0"/>
+              </a:spcAft>
+              <a:buSzPct val="80000"/>
+              <a:buFont typeface="Arial" pitchFamily="34" charset="0"/>
+              <a:buChar char="»"/>
+              <a:tabLst/>
+              <a:defRPr sz="1800"/>
+            </a:pPr>
+            <a:r>
+              <a:rPr lang="en-US" sz="2800" dirty="0" err="1" smtClean="0">
+                <a:latin typeface="Arial" pitchFamily="18"/>
+                <a:ea typeface="WenQuanYi Micro Hei" pitchFamily="2"/>
+                <a:cs typeface="Lohit Hindi" pitchFamily="2"/>
+              </a:rPr>
+              <a:t>Middelen</a:t>
+            </a:r>
+            <a:endParaRPr lang="en-US" sz="2800" dirty="0">
+              <a:latin typeface="Arial" pitchFamily="18"/>
+              <a:ea typeface="WenQuanYi Micro Hei" pitchFamily="2"/>
+              <a:cs typeface="Lohit Hindi" pitchFamily="2"/>
+            </a:endParaRPr>
+          </a:p>
+          <a:p>
+            <a:pPr marL="914400" lvl="4" indent="-457200" hangingPunct="0">
+              <a:buSzPct val="80000"/>
+              <a:buFont typeface="Arial" pitchFamily="34" charset="0"/>
+              <a:buChar char="»"/>
+              <a:defRPr sz="1800"/>
+            </a:pPr>
+            <a:r>
+              <a:rPr lang="en-US" sz="2400" dirty="0" err="1" smtClean="0">
+                <a:latin typeface="Arial" pitchFamily="18"/>
+                <a:ea typeface="WenQuanYi Micro Hei" pitchFamily="2"/>
+                <a:cs typeface="Lohit Hindi" pitchFamily="2"/>
+              </a:rPr>
+              <a:t>Programmeer</a:t>
+            </a:r>
+            <a:r>
+              <a:rPr lang="en-US" sz="2400" dirty="0" smtClean="0">
+                <a:latin typeface="Arial" pitchFamily="18"/>
+                <a:ea typeface="WenQuanYi Micro Hei" pitchFamily="2"/>
+                <a:cs typeface="Lohit Hindi" pitchFamily="2"/>
+              </a:rPr>
+              <a:t>-skills</a:t>
+            </a:r>
+          </a:p>
+          <a:p>
+            <a:pPr marL="914400" lvl="4" indent="-457200" hangingPunct="0">
+              <a:buSzPct val="80000"/>
+              <a:buFont typeface="Arial" pitchFamily="34" charset="0"/>
+              <a:buChar char="»"/>
+              <a:defRPr sz="1800"/>
+            </a:pPr>
+            <a:r>
+              <a:rPr lang="en-US" sz="2400" i="1" dirty="0" smtClean="0">
+                <a:latin typeface="Arial" pitchFamily="18"/>
+                <a:ea typeface="WenQuanYi Micro Hei" pitchFamily="2"/>
+                <a:cs typeface="Lohit Hindi" pitchFamily="2"/>
+              </a:rPr>
+              <a:t>Lego</a:t>
+            </a:r>
+            <a:r>
+              <a:rPr lang="en-US" sz="2400" dirty="0" smtClean="0">
+                <a:latin typeface="Arial" pitchFamily="18"/>
+                <a:ea typeface="WenQuanYi Micro Hei" pitchFamily="2"/>
+                <a:cs typeface="Lohit Hindi" pitchFamily="2"/>
+              </a:rPr>
+              <a:t>-Robots</a:t>
+            </a:r>
+          </a:p>
+          <a:p>
+            <a:pPr marL="914400" lvl="4" indent="-457200" hangingPunct="0">
+              <a:buSzPct val="80000"/>
+              <a:buFont typeface="Arial" pitchFamily="34" charset="0"/>
+              <a:buChar char="»"/>
+              <a:defRPr sz="1800"/>
+            </a:pPr>
+            <a:r>
+              <a:rPr lang="en-US" sz="2400" dirty="0" err="1" smtClean="0">
+                <a:latin typeface="Arial" pitchFamily="18"/>
+                <a:ea typeface="WenQuanYi Micro Hei" pitchFamily="2"/>
+                <a:cs typeface="Lohit Hindi" pitchFamily="2"/>
+              </a:rPr>
+              <a:t>Doolhoven</a:t>
+            </a:r>
+            <a:endParaRPr lang="en-US" sz="2400" dirty="0" smtClean="0">
+              <a:latin typeface="Arial" pitchFamily="18"/>
+              <a:ea typeface="WenQuanYi Micro Hei" pitchFamily="2"/>
+              <a:cs typeface="Lohit Hindi" pitchFamily="2"/>
+            </a:endParaRPr>
+          </a:p>
+          <a:p>
+            <a:pPr marL="0" marR="0" lvl="0" indent="-457200" hangingPunct="0">
+              <a:lnSpc>
+                <a:spcPct val="100000"/>
+              </a:lnSpc>
+              <a:spcBef>
+                <a:spcPts val="0"/>
+              </a:spcBef>
+              <a:spcAft>
+                <a:spcPts val="0"/>
+              </a:spcAft>
+              <a:buSzPct val="80000"/>
+              <a:buFont typeface="Arial" pitchFamily="34" charset="0"/>
+              <a:buChar char="»"/>
+              <a:tabLst/>
+              <a:defRPr sz="1800"/>
+            </a:pPr>
+            <a:r>
+              <a:rPr lang="en-US" sz="2800" dirty="0" err="1" smtClean="0">
+                <a:latin typeface="Arial" pitchFamily="18"/>
+                <a:ea typeface="WenQuanYi Micro Hei" pitchFamily="2"/>
+                <a:cs typeface="Lohit Hindi" pitchFamily="2"/>
+              </a:rPr>
+              <a:t>Uitdagingen</a:t>
+            </a:r>
+            <a:endParaRPr lang="en-US" sz="2800" dirty="0">
+              <a:latin typeface="Arial" pitchFamily="18"/>
+              <a:ea typeface="WenQuanYi Micro Hei" pitchFamily="2"/>
+              <a:cs typeface="Lohit Hindi" pitchFamily="2"/>
+            </a:endParaRPr>
+          </a:p>
+          <a:p>
+            <a:pPr marL="914400" lvl="4" indent="-457200" hangingPunct="0">
+              <a:buSzPct val="80000"/>
+              <a:buFont typeface="Arial" pitchFamily="34" charset="0"/>
+              <a:buChar char="»"/>
+              <a:defRPr sz="1800"/>
+            </a:pPr>
+            <a:r>
+              <a:rPr lang="en-US" sz="2400" dirty="0" err="1" smtClean="0">
+                <a:latin typeface="Arial" pitchFamily="18"/>
+                <a:ea typeface="WenQuanYi Micro Hei" pitchFamily="2"/>
+                <a:cs typeface="Lohit Hindi" pitchFamily="2"/>
+              </a:rPr>
+              <a:t>Virtuele</a:t>
+            </a:r>
+            <a:r>
+              <a:rPr lang="en-US" sz="2400" dirty="0" smtClean="0">
+                <a:latin typeface="Arial" pitchFamily="18"/>
+                <a:ea typeface="WenQuanYi Micro Hei" pitchFamily="2"/>
+                <a:cs typeface="Lohit Hindi" pitchFamily="2"/>
+              </a:rPr>
+              <a:t> </a:t>
+            </a:r>
+            <a:r>
+              <a:rPr lang="en-US" sz="2400" dirty="0" err="1" smtClean="0">
+                <a:latin typeface="Arial" pitchFamily="18"/>
+                <a:ea typeface="WenQuanYi Micro Hei" pitchFamily="2"/>
+                <a:cs typeface="Lohit Hindi" pitchFamily="2"/>
+              </a:rPr>
+              <a:t>bommen</a:t>
+            </a:r>
+            <a:endParaRPr lang="en-US" sz="2400" dirty="0" smtClean="0">
+              <a:latin typeface="Arial" pitchFamily="18"/>
+              <a:ea typeface="WenQuanYi Micro Hei" pitchFamily="2"/>
+              <a:cs typeface="Lohit Hindi" pitchFamily="2"/>
+            </a:endParaRPr>
+          </a:p>
+          <a:p>
+            <a:pPr marL="914400" lvl="4" indent="-457200" hangingPunct="0">
+              <a:buSzPct val="80000"/>
+              <a:buFont typeface="Arial" pitchFamily="34" charset="0"/>
+              <a:buChar char="»"/>
+              <a:defRPr sz="1800"/>
+            </a:pPr>
+            <a:r>
+              <a:rPr lang="en-US" sz="2400" dirty="0" err="1" smtClean="0">
+                <a:latin typeface="Arial" pitchFamily="18"/>
+                <a:ea typeface="WenQuanYi Micro Hei" pitchFamily="2"/>
+                <a:cs typeface="Lohit Hindi" pitchFamily="2"/>
+              </a:rPr>
+              <a:t>Communicatie</a:t>
+            </a:r>
+            <a:endParaRPr lang="en-US" sz="2400" dirty="0">
+              <a:latin typeface="Arial" pitchFamily="18"/>
+              <a:ea typeface="WenQuanYi Micro Hei" pitchFamily="2"/>
+              <a:cs typeface="Lohit Hindi" pitchFamily="2"/>
+            </a:endParaRPr>
+          </a:p>
+          <a:p>
+            <a:pPr marL="914400" lvl="4" indent="-457200" hangingPunct="0">
+              <a:buSzPct val="80000"/>
+              <a:buFont typeface="Arial" pitchFamily="34" charset="0"/>
+              <a:buChar char="»"/>
+              <a:defRPr sz="1800"/>
+            </a:pPr>
+            <a:r>
+              <a:rPr lang="en-US" sz="2400" dirty="0" err="1" smtClean="0">
+                <a:latin typeface="Arial" pitchFamily="18"/>
+                <a:ea typeface="WenQuanYi Micro Hei" pitchFamily="2"/>
+                <a:cs typeface="Lohit Hindi" pitchFamily="2"/>
+              </a:rPr>
+              <a:t>Verschillende</a:t>
+            </a:r>
+            <a:r>
+              <a:rPr lang="en-US" sz="2400" dirty="0" smtClean="0">
+                <a:latin typeface="Arial" pitchFamily="18"/>
+                <a:ea typeface="WenQuanYi Micro Hei" pitchFamily="2"/>
+                <a:cs typeface="Lohit Hindi" pitchFamily="2"/>
+              </a:rPr>
+              <a:t> power-ups.</a:t>
+            </a:r>
+            <a:endParaRPr lang="en-US" sz="2400" dirty="0" smtClean="0">
+              <a:latin typeface="Arial" pitchFamily="18"/>
+              <a:ea typeface="WenQuanYi Micro Hei" pitchFamily="2"/>
+              <a:cs typeface="Lohit Hindi" pitchFamily="2"/>
+            </a:endParaRPr>
+          </a:p>
+          <a:p>
+            <a:pPr marL="914400" lvl="4" indent="-457200" hangingPunct="0">
+              <a:buSzPct val="80000"/>
+              <a:buFont typeface="Arial" pitchFamily="34" charset="0"/>
+              <a:buChar char="»"/>
+              <a:defRPr sz="1800"/>
+            </a:pPr>
+            <a:r>
+              <a:rPr lang="en-US" sz="2400" dirty="0" err="1" smtClean="0">
+                <a:latin typeface="Arial" pitchFamily="18"/>
+                <a:ea typeface="WenQuanYi Micro Hei" pitchFamily="2"/>
+                <a:cs typeface="Lohit Hindi" pitchFamily="2"/>
+              </a:rPr>
+              <a:t>Rekening</a:t>
+            </a:r>
+            <a:r>
+              <a:rPr lang="en-US" sz="2400" dirty="0" smtClean="0">
+                <a:latin typeface="Arial" pitchFamily="18"/>
+                <a:ea typeface="WenQuanYi Micro Hei" pitchFamily="2"/>
+                <a:cs typeface="Lohit Hindi" pitchFamily="2"/>
+              </a:rPr>
+              <a:t> </a:t>
+            </a:r>
+            <a:r>
+              <a:rPr lang="en-US" sz="2400" dirty="0" err="1" smtClean="0">
+                <a:latin typeface="Arial" pitchFamily="18"/>
+                <a:ea typeface="WenQuanYi Micro Hei" pitchFamily="2"/>
+                <a:cs typeface="Lohit Hindi" pitchFamily="2"/>
+              </a:rPr>
+              <a:t>houden</a:t>
+            </a:r>
+            <a:r>
+              <a:rPr lang="en-US" sz="2400" dirty="0" smtClean="0">
+                <a:latin typeface="Arial" pitchFamily="18"/>
+                <a:ea typeface="WenQuanYi Micro Hei" pitchFamily="2"/>
+                <a:cs typeface="Lohit Hindi" pitchFamily="2"/>
+              </a:rPr>
+              <a:t> met </a:t>
+            </a:r>
+            <a:r>
+              <a:rPr lang="en-US" sz="2400" dirty="0" err="1" smtClean="0">
+                <a:latin typeface="Arial" pitchFamily="18"/>
+                <a:ea typeface="WenQuanYi Micro Hei" pitchFamily="2"/>
+                <a:cs typeface="Lohit Hindi" pitchFamily="2"/>
+              </a:rPr>
+              <a:t>ander</a:t>
+            </a:r>
+            <a:r>
+              <a:rPr lang="en-US" sz="2400" dirty="0" smtClean="0">
+                <a:latin typeface="Arial" pitchFamily="18"/>
+                <a:ea typeface="WenQuanYi Micro Hei" pitchFamily="2"/>
+                <a:cs typeface="Lohit Hindi" pitchFamily="2"/>
+              </a:rPr>
+              <a:t> ‘</a:t>
+            </a:r>
+            <a:r>
+              <a:rPr lang="en-US" sz="2400" i="1" dirty="0" err="1" smtClean="0">
+                <a:latin typeface="Arial" pitchFamily="18"/>
+                <a:ea typeface="WenQuanYi Micro Hei" pitchFamily="2"/>
+                <a:cs typeface="Lohit Hindi" pitchFamily="2"/>
+              </a:rPr>
+              <a:t>leven</a:t>
+            </a:r>
+            <a:r>
+              <a:rPr lang="en-US" sz="2400" dirty="0" smtClean="0">
+                <a:latin typeface="Arial" pitchFamily="18"/>
+                <a:ea typeface="WenQuanYi Micro Hei" pitchFamily="2"/>
+                <a:cs typeface="Lohit Hindi" pitchFamily="2"/>
+              </a:rPr>
+              <a:t>’</a:t>
+            </a:r>
+          </a:p>
+          <a:p>
+            <a:pPr marL="457200" lvl="4" hangingPunct="0">
+              <a:buSzPct val="80000"/>
+              <a:defRPr sz="1800"/>
+            </a:pPr>
+            <a:endParaRPr lang="en-US" sz="2400" dirty="0" smtClean="0">
+              <a:latin typeface="Arial" pitchFamily="18"/>
+              <a:ea typeface="WenQuanYi Micro Hei" pitchFamily="2"/>
+              <a:cs typeface="Lohit Hindi" pitchFamily="2"/>
+            </a:endParaRPr>
+          </a:p>
+        </p:txBody>
+      </p:sp>
+    </p:spTree>
+    <p:extLst>
+      <p:ext uri="{BB962C8B-B14F-4D97-AF65-F5344CB8AC3E}">
+        <p14:creationId xmlns:p14="http://schemas.microsoft.com/office/powerpoint/2010/main" val="4168905836"/>
+      </p:ext>
+    </p:extLst>
+  </p:cSld>
+  <p:clrMapOvr>
+    <a:masterClrMapping/>
+  </p:clrMapOvr>
+  <mc:AlternateContent xmlns:mc="http://schemas.openxmlformats.org/markup-compatibility/2006" xmlns:p14="http://schemas.microsoft.com/office/powerpoint/2010/main">
+    <mc:Choice Requires="p14">
+      <p:transition spd="med" p14:dur="700">
+        <p:fade/>
+      </p:transition>
+    </mc:Choice>
+    <mc:Fallback xmlns="">
+      <p:transition spd="med">
+        <p:fade/>
+      </p:transition>
+    </mc:Fallback>
+  </mc:AlternateContent>
+  <p:timing>
+    <p:tnLst>
+      <p:par>
+        <p:cTn id="1" dur="indefinite" restart="never" nodeType="tmRoot">
+          <p:childTnLst>
+            <p:seq concurrent="1" nextAc="seek">
+              <p:cTn id="2" dur="indefinite" nodeType="mainSeq">
+                <p:childTnLst>
+                  <p:par>
+                    <p:cTn id="3" fill="hold">
+                      <p:stCondLst>
+                        <p:cond delay="indefinite"/>
+                      </p:stCondLst>
+                      <p:childTnLst>
+                        <p:par>
+                          <p:cTn id="4" fill="hold">
+                            <p:stCondLst>
+                              <p:cond delay="0"/>
+                            </p:stCondLst>
+                            <p:childTnLst>
+                              <p:par>
+                                <p:cTn id="5" presetID="10" presetClass="entr" presetSubtype="0" fill="hold" nodeType="clickEffect">
+                                  <p:stCondLst>
+                                    <p:cond delay="0"/>
+                                  </p:stCondLst>
+                                  <p:childTnLst>
+                                    <p:set>
+                                      <p:cBhvr>
+                                        <p:cTn id="6" dur="1" fill="hold">
+                                          <p:stCondLst>
+                                            <p:cond delay="0"/>
+                                          </p:stCondLst>
+                                        </p:cTn>
+                                        <p:tgtEl>
+                                          <p:spTgt spid="9">
+                                            <p:txEl>
+                                              <p:pRg st="0" end="0"/>
+                                            </p:txEl>
+                                          </p:spTgt>
+                                        </p:tgtEl>
+                                        <p:attrNameLst>
+                                          <p:attrName>style.visibility</p:attrName>
+                                        </p:attrNameLst>
+                                      </p:cBhvr>
+                                      <p:to>
+                                        <p:strVal val="visible"/>
+                                      </p:to>
+                                    </p:set>
+                                    <p:animEffect transition="in" filter="fade">
+                                      <p:cBhvr>
+                                        <p:cTn id="7" dur="500"/>
+                                        <p:tgtEl>
+                                          <p:spTgt spid="9">
+                                            <p:txEl>
+                                              <p:pRg st="0" end="0"/>
+                                            </p:txEl>
+                                          </p:spTgt>
+                                        </p:tgtEl>
+                                      </p:cBhvr>
+                                    </p:animEffect>
+                                  </p:childTnLst>
+                                </p:cTn>
+                              </p:par>
+                            </p:childTnLst>
+                          </p:cTn>
+                        </p:par>
+                      </p:childTnLst>
+                    </p:cTn>
+                  </p:par>
+                  <p:par>
+                    <p:cTn id="8" fill="hold">
+                      <p:stCondLst>
+                        <p:cond delay="indefinite"/>
+                      </p:stCondLst>
+                      <p:childTnLst>
+                        <p:par>
+                          <p:cTn id="9" fill="hold">
+                            <p:stCondLst>
+                              <p:cond delay="0"/>
+                            </p:stCondLst>
+                            <p:childTnLst>
+                              <p:par>
+                                <p:cTn id="10" presetID="10" presetClass="entr" presetSubtype="0" fill="hold" nodeType="clickEffect">
+                                  <p:stCondLst>
+                                    <p:cond delay="0"/>
+                                  </p:stCondLst>
+                                  <p:childTnLst>
+                                    <p:set>
+                                      <p:cBhvr>
+                                        <p:cTn id="11" dur="1" fill="hold">
+                                          <p:stCondLst>
+                                            <p:cond delay="0"/>
+                                          </p:stCondLst>
+                                        </p:cTn>
+                                        <p:tgtEl>
+                                          <p:spTgt spid="9">
+                                            <p:txEl>
+                                              <p:pRg st="1" end="1"/>
+                                            </p:txEl>
+                                          </p:spTgt>
+                                        </p:tgtEl>
+                                        <p:attrNameLst>
+                                          <p:attrName>style.visibility</p:attrName>
+                                        </p:attrNameLst>
+                                      </p:cBhvr>
+                                      <p:to>
+                                        <p:strVal val="visible"/>
+                                      </p:to>
+                                    </p:set>
+                                    <p:animEffect transition="in" filter="fade">
+                                      <p:cBhvr>
+                                        <p:cTn id="12" dur="500"/>
+                                        <p:tgtEl>
+                                          <p:spTgt spid="9">
+                                            <p:txEl>
+                                              <p:pRg st="1" end="1"/>
+                                            </p:txEl>
+                                          </p:spTgt>
+                                        </p:tgtEl>
+                                      </p:cBhvr>
+                                    </p:animEffect>
+                                  </p:childTnLst>
+                                </p:cTn>
+                              </p:par>
+                            </p:childTnLst>
+                          </p:cTn>
+                        </p:par>
+                      </p:childTnLst>
+                    </p:cTn>
+                  </p:par>
+                  <p:par>
+                    <p:cTn id="13" fill="hold">
+                      <p:stCondLst>
+                        <p:cond delay="indefinite"/>
+                      </p:stCondLst>
+                      <p:childTnLst>
+                        <p:par>
+                          <p:cTn id="14" fill="hold">
+                            <p:stCondLst>
+                              <p:cond delay="0"/>
+                            </p:stCondLst>
+                            <p:childTnLst>
+                              <p:par>
+                                <p:cTn id="15" presetID="10" presetClass="entr" presetSubtype="0" fill="hold" nodeType="clickEffect">
+                                  <p:stCondLst>
+                                    <p:cond delay="0"/>
+                                  </p:stCondLst>
+                                  <p:childTnLst>
+                                    <p:set>
+                                      <p:cBhvr>
+                                        <p:cTn id="16" dur="1" fill="hold">
+                                          <p:stCondLst>
+                                            <p:cond delay="0"/>
+                                          </p:stCondLst>
+                                        </p:cTn>
+                                        <p:tgtEl>
+                                          <p:spTgt spid="9">
+                                            <p:txEl>
+                                              <p:pRg st="2" end="2"/>
+                                            </p:txEl>
+                                          </p:spTgt>
+                                        </p:tgtEl>
+                                        <p:attrNameLst>
+                                          <p:attrName>style.visibility</p:attrName>
+                                        </p:attrNameLst>
+                                      </p:cBhvr>
+                                      <p:to>
+                                        <p:strVal val="visible"/>
+                                      </p:to>
+                                    </p:set>
+                                    <p:animEffect transition="in" filter="fade">
+                                      <p:cBhvr>
+                                        <p:cTn id="17" dur="500"/>
+                                        <p:tgtEl>
+                                          <p:spTgt spid="9">
+                                            <p:txEl>
+                                              <p:pRg st="2" end="2"/>
+                                            </p:txEl>
+                                          </p:spTgt>
+                                        </p:tgtEl>
+                                      </p:cBhvr>
+                                    </p:animEffect>
+                                  </p:childTnLst>
+                                </p:cTn>
+                              </p:par>
+                            </p:childTnLst>
+                          </p:cTn>
+                        </p:par>
+                        <p:par>
+                          <p:cTn id="18" fill="hold">
+                            <p:stCondLst>
+                              <p:cond delay="500"/>
+                            </p:stCondLst>
+                            <p:childTnLst>
+                              <p:par>
+                                <p:cTn id="19" presetID="10" presetClass="entr" presetSubtype="0" fill="hold" nodeType="afterEffect">
+                                  <p:stCondLst>
+                                    <p:cond delay="0"/>
+                                  </p:stCondLst>
+                                  <p:childTnLst>
+                                    <p:set>
+                                      <p:cBhvr>
+                                        <p:cTn id="20" dur="1" fill="hold">
+                                          <p:stCondLst>
+                                            <p:cond delay="0"/>
+                                          </p:stCondLst>
+                                        </p:cTn>
+                                        <p:tgtEl>
+                                          <p:spTgt spid="9">
+                                            <p:txEl>
+                                              <p:pRg st="3" end="3"/>
+                                            </p:txEl>
+                                          </p:spTgt>
+                                        </p:tgtEl>
+                                        <p:attrNameLst>
+                                          <p:attrName>style.visibility</p:attrName>
+                                        </p:attrNameLst>
+                                      </p:cBhvr>
+                                      <p:to>
+                                        <p:strVal val="visible"/>
+                                      </p:to>
+                                    </p:set>
+                                    <p:animEffect transition="in" filter="fade">
+                                      <p:cBhvr>
+                                        <p:cTn id="21" dur="500"/>
+                                        <p:tgtEl>
+                                          <p:spTgt spid="9">
+                                            <p:txEl>
+                                              <p:pRg st="3" end="3"/>
+                                            </p:txEl>
+                                          </p:spTgt>
+                                        </p:tgtEl>
+                                      </p:cBhvr>
+                                    </p:animEffect>
+                                  </p:childTnLst>
+                                </p:cTn>
+                              </p:par>
+                            </p:childTnLst>
+                          </p:cTn>
+                        </p:par>
+                        <p:par>
+                          <p:cTn id="22" fill="hold">
+                            <p:stCondLst>
+                              <p:cond delay="1000"/>
+                            </p:stCondLst>
+                            <p:childTnLst>
+                              <p:par>
+                                <p:cTn id="23" presetID="10" presetClass="entr" presetSubtype="0" fill="hold" nodeType="afterEffect">
+                                  <p:stCondLst>
+                                    <p:cond delay="0"/>
+                                  </p:stCondLst>
+                                  <p:childTnLst>
+                                    <p:set>
+                                      <p:cBhvr>
+                                        <p:cTn id="24" dur="1" fill="hold">
+                                          <p:stCondLst>
+                                            <p:cond delay="0"/>
+                                          </p:stCondLst>
+                                        </p:cTn>
+                                        <p:tgtEl>
+                                          <p:spTgt spid="9">
+                                            <p:txEl>
+                                              <p:pRg st="4" end="4"/>
+                                            </p:txEl>
+                                          </p:spTgt>
+                                        </p:tgtEl>
+                                        <p:attrNameLst>
+                                          <p:attrName>style.visibility</p:attrName>
+                                        </p:attrNameLst>
+                                      </p:cBhvr>
+                                      <p:to>
+                                        <p:strVal val="visible"/>
+                                      </p:to>
+                                    </p:set>
+                                    <p:animEffect transition="in" filter="fade">
+                                      <p:cBhvr>
+                                        <p:cTn id="25" dur="500"/>
+                                        <p:tgtEl>
+                                          <p:spTgt spid="9">
+                                            <p:txEl>
+                                              <p:pRg st="4" end="4"/>
+                                            </p:txEl>
+                                          </p:spTgt>
+                                        </p:tgtEl>
+                                      </p:cBhvr>
+                                    </p:animEffect>
+                                  </p:childTnLst>
+                                </p:cTn>
+                              </p:par>
+                            </p:childTnLst>
+                          </p:cTn>
+                        </p:par>
+                        <p:par>
+                          <p:cTn id="26" fill="hold">
+                            <p:stCondLst>
+                              <p:cond delay="1500"/>
+                            </p:stCondLst>
+                            <p:childTnLst>
+                              <p:par>
+                                <p:cTn id="27" presetID="10" presetClass="entr" presetSubtype="0" fill="hold" nodeType="afterEffect">
+                                  <p:stCondLst>
+                                    <p:cond delay="0"/>
+                                  </p:stCondLst>
+                                  <p:childTnLst>
+                                    <p:set>
+                                      <p:cBhvr>
+                                        <p:cTn id="28" dur="1" fill="hold">
+                                          <p:stCondLst>
+                                            <p:cond delay="0"/>
+                                          </p:stCondLst>
+                                        </p:cTn>
+                                        <p:tgtEl>
+                                          <p:spTgt spid="9">
+                                            <p:txEl>
+                                              <p:pRg st="5" end="5"/>
+                                            </p:txEl>
+                                          </p:spTgt>
+                                        </p:tgtEl>
+                                        <p:attrNameLst>
+                                          <p:attrName>style.visibility</p:attrName>
+                                        </p:attrNameLst>
+                                      </p:cBhvr>
+                                      <p:to>
+                                        <p:strVal val="visible"/>
+                                      </p:to>
+                                    </p:set>
+                                    <p:animEffect transition="in" filter="fade">
+                                      <p:cBhvr>
+                                        <p:cTn id="29" dur="500"/>
+                                        <p:tgtEl>
+                                          <p:spTgt spid="9">
+                                            <p:txEl>
+                                              <p:pRg st="5" end="5"/>
+                                            </p:txEl>
+                                          </p:spTgt>
+                                        </p:tgtEl>
+                                      </p:cBhvr>
+                                    </p:animEffect>
+                                  </p:childTnLst>
+                                </p:cTn>
+                              </p:par>
+                            </p:childTnLst>
+                          </p:cTn>
+                        </p:par>
+                      </p:childTnLst>
+                    </p:cTn>
+                  </p:par>
+                  <p:par>
+                    <p:cTn id="30" fill="hold">
+                      <p:stCondLst>
+                        <p:cond delay="indefinite"/>
+                      </p:stCondLst>
+                      <p:childTnLst>
+                        <p:par>
+                          <p:cTn id="31" fill="hold">
+                            <p:stCondLst>
+                              <p:cond delay="0"/>
+                            </p:stCondLst>
+                            <p:childTnLst>
+                              <p:par>
+                                <p:cTn id="32" presetID="10" presetClass="entr" presetSubtype="0" fill="hold" nodeType="clickEffect">
+                                  <p:stCondLst>
+                                    <p:cond delay="0"/>
+                                  </p:stCondLst>
+                                  <p:childTnLst>
+                                    <p:set>
+                                      <p:cBhvr>
+                                        <p:cTn id="33" dur="1" fill="hold">
+                                          <p:stCondLst>
+                                            <p:cond delay="0"/>
+                                          </p:stCondLst>
+                                        </p:cTn>
+                                        <p:tgtEl>
+                                          <p:spTgt spid="9">
+                                            <p:txEl>
+                                              <p:pRg st="6" end="6"/>
+                                            </p:txEl>
+                                          </p:spTgt>
+                                        </p:tgtEl>
+                                        <p:attrNameLst>
+                                          <p:attrName>style.visibility</p:attrName>
+                                        </p:attrNameLst>
+                                      </p:cBhvr>
+                                      <p:to>
+                                        <p:strVal val="visible"/>
+                                      </p:to>
+                                    </p:set>
+                                    <p:animEffect transition="in" filter="fade">
+                                      <p:cBhvr>
+                                        <p:cTn id="34" dur="500"/>
+                                        <p:tgtEl>
+                                          <p:spTgt spid="9">
+                                            <p:txEl>
+                                              <p:pRg st="6" end="6"/>
+                                            </p:txEl>
+                                          </p:spTgt>
+                                        </p:tgtEl>
+                                      </p:cBhvr>
+                                    </p:animEffect>
+                                  </p:childTnLst>
+                                </p:cTn>
+                              </p:par>
+                            </p:childTnLst>
+                          </p:cTn>
+                        </p:par>
+                        <p:par>
+                          <p:cTn id="35" fill="hold">
+                            <p:stCondLst>
+                              <p:cond delay="500"/>
+                            </p:stCondLst>
+                            <p:childTnLst>
+                              <p:par>
+                                <p:cTn id="36" presetID="10" presetClass="entr" presetSubtype="0" fill="hold" nodeType="afterEffect">
+                                  <p:stCondLst>
+                                    <p:cond delay="0"/>
+                                  </p:stCondLst>
+                                  <p:childTnLst>
+                                    <p:set>
+                                      <p:cBhvr>
+                                        <p:cTn id="37" dur="1" fill="hold">
+                                          <p:stCondLst>
+                                            <p:cond delay="0"/>
+                                          </p:stCondLst>
+                                        </p:cTn>
+                                        <p:tgtEl>
+                                          <p:spTgt spid="9">
+                                            <p:txEl>
+                                              <p:pRg st="7" end="7"/>
+                                            </p:txEl>
+                                          </p:spTgt>
+                                        </p:tgtEl>
+                                        <p:attrNameLst>
+                                          <p:attrName>style.visibility</p:attrName>
+                                        </p:attrNameLst>
+                                      </p:cBhvr>
+                                      <p:to>
+                                        <p:strVal val="visible"/>
+                                      </p:to>
+                                    </p:set>
+                                    <p:animEffect transition="in" filter="fade">
+                                      <p:cBhvr>
+                                        <p:cTn id="38" dur="500"/>
+                                        <p:tgtEl>
+                                          <p:spTgt spid="9">
+                                            <p:txEl>
+                                              <p:pRg st="7" end="7"/>
+                                            </p:txEl>
+                                          </p:spTgt>
+                                        </p:tgtEl>
+                                      </p:cBhvr>
+                                    </p:animEffect>
+                                  </p:childTnLst>
+                                </p:cTn>
+                              </p:par>
+                            </p:childTnLst>
+                          </p:cTn>
+                        </p:par>
+                        <p:par>
+                          <p:cTn id="39" fill="hold">
+                            <p:stCondLst>
+                              <p:cond delay="1000"/>
+                            </p:stCondLst>
+                            <p:childTnLst>
+                              <p:par>
+                                <p:cTn id="40" presetID="10" presetClass="entr" presetSubtype="0" fill="hold" nodeType="afterEffect">
+                                  <p:stCondLst>
+                                    <p:cond delay="0"/>
+                                  </p:stCondLst>
+                                  <p:childTnLst>
+                                    <p:set>
+                                      <p:cBhvr>
+                                        <p:cTn id="41" dur="1" fill="hold">
+                                          <p:stCondLst>
+                                            <p:cond delay="0"/>
+                                          </p:stCondLst>
+                                        </p:cTn>
+                                        <p:tgtEl>
+                                          <p:spTgt spid="9">
+                                            <p:txEl>
+                                              <p:pRg st="8" end="8"/>
+                                            </p:txEl>
+                                          </p:spTgt>
+                                        </p:tgtEl>
+                                        <p:attrNameLst>
+                                          <p:attrName>style.visibility</p:attrName>
+                                        </p:attrNameLst>
+                                      </p:cBhvr>
+                                      <p:to>
+                                        <p:strVal val="visible"/>
+                                      </p:to>
+                                    </p:set>
+                                    <p:animEffect transition="in" filter="fade">
+                                      <p:cBhvr>
+                                        <p:cTn id="42" dur="500"/>
+                                        <p:tgtEl>
+                                          <p:spTgt spid="9">
+                                            <p:txEl>
+                                              <p:pRg st="8" end="8"/>
+                                            </p:txEl>
+                                          </p:spTgt>
+                                        </p:tgtEl>
+                                      </p:cBhvr>
+                                    </p:animEffect>
+                                  </p:childTnLst>
+                                </p:cTn>
+                              </p:par>
+                            </p:childTnLst>
+                          </p:cTn>
+                        </p:par>
+                        <p:par>
+                          <p:cTn id="43" fill="hold">
+                            <p:stCondLst>
+                              <p:cond delay="1500"/>
+                            </p:stCondLst>
+                            <p:childTnLst>
+                              <p:par>
+                                <p:cTn id="44" presetID="10" presetClass="entr" presetSubtype="0" fill="hold" nodeType="afterEffect">
+                                  <p:stCondLst>
+                                    <p:cond delay="0"/>
+                                  </p:stCondLst>
+                                  <p:childTnLst>
+                                    <p:set>
+                                      <p:cBhvr>
+                                        <p:cTn id="45" dur="1" fill="hold">
+                                          <p:stCondLst>
+                                            <p:cond delay="0"/>
+                                          </p:stCondLst>
+                                        </p:cTn>
+                                        <p:tgtEl>
+                                          <p:spTgt spid="9">
+                                            <p:txEl>
+                                              <p:pRg st="9" end="9"/>
+                                            </p:txEl>
+                                          </p:spTgt>
+                                        </p:tgtEl>
+                                        <p:attrNameLst>
+                                          <p:attrName>style.visibility</p:attrName>
+                                        </p:attrNameLst>
+                                      </p:cBhvr>
+                                      <p:to>
+                                        <p:strVal val="visible"/>
+                                      </p:to>
+                                    </p:set>
+                                    <p:animEffect transition="in" filter="fade">
+                                      <p:cBhvr>
+                                        <p:cTn id="46" dur="500"/>
+                                        <p:tgtEl>
+                                          <p:spTgt spid="9">
+                                            <p:txEl>
+                                              <p:pRg st="9" end="9"/>
+                                            </p:txEl>
+                                          </p:spTgt>
+                                        </p:tgtEl>
+                                      </p:cBhvr>
+                                    </p:animEffect>
+                                  </p:childTnLst>
+                                </p:cTn>
+                              </p:par>
+                            </p:childTnLst>
+                          </p:cTn>
+                        </p:par>
+                        <p:par>
+                          <p:cTn id="47" fill="hold">
+                            <p:stCondLst>
+                              <p:cond delay="2000"/>
+                            </p:stCondLst>
+                            <p:childTnLst>
+                              <p:par>
+                                <p:cTn id="48" presetID="10" presetClass="entr" presetSubtype="0" fill="hold" nodeType="afterEffect">
+                                  <p:stCondLst>
+                                    <p:cond delay="0"/>
+                                  </p:stCondLst>
+                                  <p:childTnLst>
+                                    <p:set>
+                                      <p:cBhvr>
+                                        <p:cTn id="49" dur="1" fill="hold">
+                                          <p:stCondLst>
+                                            <p:cond delay="0"/>
+                                          </p:stCondLst>
+                                        </p:cTn>
+                                        <p:tgtEl>
+                                          <p:spTgt spid="9">
+                                            <p:txEl>
+                                              <p:pRg st="10" end="10"/>
+                                            </p:txEl>
+                                          </p:spTgt>
+                                        </p:tgtEl>
+                                        <p:attrNameLst>
+                                          <p:attrName>style.visibility</p:attrName>
+                                        </p:attrNameLst>
+                                      </p:cBhvr>
+                                      <p:to>
+                                        <p:strVal val="visible"/>
+                                      </p:to>
+                                    </p:set>
+                                    <p:animEffect transition="in" filter="fade">
+                                      <p:cBhvr>
+                                        <p:cTn id="50" dur="500"/>
+                                        <p:tgtEl>
+                                          <p:spTgt spid="9">
+                                            <p:txEl>
+                                              <p:pRg st="10" end="10"/>
+                                            </p:txEl>
+                                          </p:spTgt>
+                                        </p:tgtEl>
+                                      </p:cBhvr>
+                                    </p:animEffect>
+                                  </p:childTnLst>
+                                </p:cTn>
+                              </p:par>
+                            </p:childTnLst>
+                          </p:cTn>
+                        </p:par>
+                      </p:childTnLst>
+                    </p:cTn>
+                  </p:par>
+                </p:childTnLst>
+              </p:cTn>
+              <p:prevCondLst>
+                <p:cond evt="onPrev" delay="0">
+                  <p:tgtEl>
+                    <p:sldTgt/>
+                  </p:tgtEl>
+                </p:cond>
+              </p:prevCondLst>
+              <p:nextCondLst>
+                <p:cond evt="onNext" delay="0">
+                  <p:tgtEl>
+                    <p:sldTgt/>
+                  </p:tgtEl>
+                </p:cond>
+              </p:nextCondLst>
+            </p:seq>
+          </p:childTnLst>
+        </p:cTn>
+      </p:par>
+    </p:tnLst>
+  </p:timing>
+</p:sld>
+</file>
+
 <file path=ppt/slides/slide2.xml><?xml version="1.0" encoding="utf-8"?>
 <p:sld xmlns:a="http://schemas.openxmlformats.org/drawingml/2006/main" xmlns:r="http://schemas.openxmlformats.org/officeDocument/2006/relationships" xmlns:p="http://schemas.openxmlformats.org/presentationml/2006/main">
   <p:cSld name="page2">
@@ -12079,13 +15403,13 @@
   <p:clrMapOvr>
     <a:masterClrMapping/>
   </p:clrMapOvr>
-  <mc:AlternateContent xmlns:mc="http://schemas.openxmlformats.org/markup-compatibility/2006">
-    <mc:Choice xmlns:p14="http://schemas.microsoft.com/office/powerpoint/2010/main" Requires="p14">
+  <mc:AlternateContent xmlns:mc="http://schemas.openxmlformats.org/markup-compatibility/2006" xmlns:p14="http://schemas.microsoft.com/office/powerpoint/2010/main">
+    <mc:Choice Requires="p14">
       <p:transition spd="med" p14:dur="700">
         <p:fade/>
       </p:transition>
     </mc:Choice>
-    <mc:Fallback>
+    <mc:Fallback xmlns="">
       <p:transition spd="med">
         <p:fade/>
       </p:transition>
@@ -12979,13 +16303,13 @@
   <p:clrMapOvr>
     <a:overrideClrMapping bg1="lt1" tx1="dk1" bg2="lt2" tx2="dk2" accent1="accent1" accent2="accent2" accent3="accent3" accent4="accent4" accent5="accent5" accent6="accent6" hlink="hlink" folHlink="folHlink"/>
   </p:clrMapOvr>
-  <mc:AlternateContent xmlns:mc="http://schemas.openxmlformats.org/markup-compatibility/2006">
-    <mc:Choice xmlns:p14="http://schemas.microsoft.com/office/powerpoint/2010/main" Requires="p14">
+  <mc:AlternateContent xmlns:mc="http://schemas.openxmlformats.org/markup-compatibility/2006" xmlns:p14="http://schemas.microsoft.com/office/powerpoint/2010/main">
+    <mc:Choice Requires="p14">
       <p:transition spd="med" p14:dur="700">
         <p:fade/>
       </p:transition>
     </mc:Choice>
-    <mc:Fallback>
+    <mc:Fallback xmlns="">
       <p:transition spd="med">
         <p:fade/>
       </p:transition>
@@ -13378,7 +16702,7 @@
       </p:pic>
       <p:pic>
         <p:nvPicPr>
-          <p:cNvPr id="5" name=""/>
+          <p:cNvPr id="5" name="Afbeelding 4"/>
           <p:cNvPicPr>
             <a:picLocks noChangeAspect="1"/>
           </p:cNvPicPr>
@@ -13710,13 +17034,13 @@
   <p:clrMapOvr>
     <a:masterClrMapping/>
   </p:clrMapOvr>
-  <mc:AlternateContent xmlns:mc="http://schemas.openxmlformats.org/markup-compatibility/2006">
-    <mc:Choice xmlns:p14="http://schemas.microsoft.com/office/powerpoint/2010/main" Requires="p14">
+  <mc:AlternateContent xmlns:mc="http://schemas.openxmlformats.org/markup-compatibility/2006" xmlns:p14="http://schemas.microsoft.com/office/powerpoint/2010/main">
+    <mc:Choice Requires="p14">
       <p:transition spd="med" p14:dur="700">
         <p:fade/>
       </p:transition>
     </mc:Choice>
-    <mc:Fallback>
+    <mc:Fallback xmlns="">
       <p:transition spd="med">
         <p:fade/>
       </p:transition>
@@ -14631,13 +17955,13 @@
   <p:clrMapOvr>
     <a:overrideClrMapping bg1="lt1" tx1="dk1" bg2="lt2" tx2="dk2" accent1="accent1" accent2="accent2" accent3="accent3" accent4="accent4" accent5="accent5" accent6="accent6" hlink="hlink" folHlink="folHlink"/>
   </p:clrMapOvr>
-  <mc:AlternateContent xmlns:mc="http://schemas.openxmlformats.org/markup-compatibility/2006">
-    <mc:Choice xmlns:p14="http://schemas.microsoft.com/office/powerpoint/2010/main" Requires="p14">
+  <mc:AlternateContent xmlns:mc="http://schemas.openxmlformats.org/markup-compatibility/2006" xmlns:p14="http://schemas.microsoft.com/office/powerpoint/2010/main">
+    <mc:Choice Requires="p14">
       <p:transition spd="med" p14:dur="700">
         <p:fade/>
       </p:transition>
     </mc:Choice>
-    <mc:Fallback>
+    <mc:Fallback xmlns="">
       <p:transition spd="med">
         <p:fade/>
       </p:transition>
@@ -15458,7 +18782,7 @@
       </p:sp>
       <p:pic>
         <p:nvPicPr>
-          <p:cNvPr id="5" name=""/>
+          <p:cNvPr id="5" name="Afbeelding 4"/>
           <p:cNvPicPr>
             <a:picLocks noChangeAspect="1"/>
           </p:cNvPicPr>
@@ -15490,7 +18814,7 @@
       </p:pic>
       <p:pic>
         <p:nvPicPr>
-          <p:cNvPr id="6" name=""/>
+          <p:cNvPr id="6" name="Afbeelding 5"/>
           <p:cNvPicPr>
             <a:picLocks noChangeAspect="1"/>
           </p:cNvPicPr>
@@ -15522,7 +18846,7 @@
       </p:pic>
       <p:pic>
         <p:nvPicPr>
-          <p:cNvPr id="7" name=""/>
+          <p:cNvPr id="7" name="Afbeelding 6"/>
           <p:cNvPicPr>
             <a:picLocks noChangeAspect="1"/>
           </p:cNvPicPr>
@@ -15554,7 +18878,7 @@
       </p:pic>
       <p:pic>
         <p:nvPicPr>
-          <p:cNvPr id="8" name=""/>
+          <p:cNvPr id="8" name="Afbeelding 7"/>
           <p:cNvPicPr>
             <a:picLocks noChangeAspect="1"/>
           </p:cNvPicPr>
@@ -15586,7 +18910,7 @@
       </p:pic>
       <p:pic>
         <p:nvPicPr>
-          <p:cNvPr id="9" name=""/>
+          <p:cNvPr id="9" name="Afbeelding 8"/>
           <p:cNvPicPr>
             <a:picLocks noChangeAspect="1"/>
           </p:cNvPicPr>
@@ -15618,7 +18942,7 @@
       </p:pic>
       <p:pic>
         <p:nvPicPr>
-          <p:cNvPr id="10" name=""/>
+          <p:cNvPr id="10" name="Afbeelding 9"/>
           <p:cNvPicPr>
             <a:picLocks noChangeAspect="1"/>
           </p:cNvPicPr>
@@ -15650,7 +18974,7 @@
       </p:pic>
       <p:pic>
         <p:nvPicPr>
-          <p:cNvPr id="11" name=""/>
+          <p:cNvPr id="11" name="Afbeelding 10"/>
           <p:cNvPicPr>
             <a:picLocks noChangeAspect="1"/>
           </p:cNvPicPr>
@@ -15682,7 +19006,7 @@
       </p:pic>
       <p:pic>
         <p:nvPicPr>
-          <p:cNvPr id="12" name=""/>
+          <p:cNvPr id="12" name="Afbeelding 11"/>
           <p:cNvPicPr>
             <a:picLocks noChangeAspect="1"/>
           </p:cNvPicPr>
@@ -15714,7 +19038,7 @@
       </p:pic>
       <p:pic>
         <p:nvPicPr>
-          <p:cNvPr id="13" name=""/>
+          <p:cNvPr id="13" name="Afbeelding 12"/>
           <p:cNvPicPr>
             <a:picLocks noChangeAspect="1"/>
           </p:cNvPicPr>
@@ -15746,7 +19070,7 @@
       </p:pic>
       <p:pic>
         <p:nvPicPr>
-          <p:cNvPr id="14" name=""/>
+          <p:cNvPr id="14" name="Afbeelding 13"/>
           <p:cNvPicPr>
             <a:picLocks noChangeAspect="1"/>
           </p:cNvPicPr>
@@ -16052,13 +19376,13 @@
   <p:clrMapOvr>
     <a:masterClrMapping/>
   </p:clrMapOvr>
-  <mc:AlternateContent xmlns:mc="http://schemas.openxmlformats.org/markup-compatibility/2006">
-    <mc:Choice xmlns:p14="http://schemas.microsoft.com/office/powerpoint/2010/main" Requires="p14">
+  <mc:AlternateContent xmlns:mc="http://schemas.openxmlformats.org/markup-compatibility/2006" xmlns:p14="http://schemas.microsoft.com/office/powerpoint/2010/main">
+    <mc:Choice Requires="p14">
       <p:transition spd="med" p14:dur="700">
         <p:fade/>
       </p:transition>
     </mc:Choice>
-    <mc:Fallback>
+    <mc:Fallback xmlns="">
       <p:transition spd="med">
         <p:fade/>
       </p:transition>
@@ -16974,7 +20298,7 @@
       </p:sp>
       <p:pic>
         <p:nvPicPr>
-          <p:cNvPr id="6" name=""/>
+          <p:cNvPr id="6" name="Afbeelding 5"/>
           <p:cNvPicPr>
             <a:picLocks noChangeAspect="1"/>
           </p:cNvPicPr>
@@ -17006,7 +20330,7 @@
       </p:pic>
       <p:pic>
         <p:nvPicPr>
-          <p:cNvPr id="7" name=""/>
+          <p:cNvPr id="7" name="Afbeelding 6"/>
           <p:cNvPicPr>
             <a:picLocks noChangeAspect="1"/>
           </p:cNvPicPr>
@@ -17038,7 +20362,7 @@
       </p:pic>
       <p:pic>
         <p:nvPicPr>
-          <p:cNvPr id="8" name=""/>
+          <p:cNvPr id="8" name="Afbeelding 7"/>
           <p:cNvPicPr>
             <a:picLocks noChangeAspect="1"/>
           </p:cNvPicPr>
@@ -17070,7 +20394,7 @@
       </p:pic>
       <p:pic>
         <p:nvPicPr>
-          <p:cNvPr id="9" name=""/>
+          <p:cNvPr id="9" name="Afbeelding 8"/>
           <p:cNvPicPr>
             <a:picLocks noChangeAspect="1"/>
           </p:cNvPicPr>
@@ -17102,7 +20426,7 @@
       </p:pic>
       <p:pic>
         <p:nvPicPr>
-          <p:cNvPr id="10" name=""/>
+          <p:cNvPr id="10" name="Afbeelding 9"/>
           <p:cNvPicPr>
             <a:picLocks noChangeAspect="1"/>
           </p:cNvPicPr>
@@ -17408,13 +20732,13 @@
   <p:clrMapOvr>
     <a:masterClrMapping/>
   </p:clrMapOvr>
-  <mc:AlternateContent xmlns:mc="http://schemas.openxmlformats.org/markup-compatibility/2006">
-    <mc:Choice xmlns:p14="http://schemas.microsoft.com/office/powerpoint/2010/main" Requires="p14">
+  <mc:AlternateContent xmlns:mc="http://schemas.openxmlformats.org/markup-compatibility/2006" xmlns:p14="http://schemas.microsoft.com/office/powerpoint/2010/main">
+    <mc:Choice Requires="p14">
       <p:transition spd="med" p14:dur="700">
         <p:fade/>
       </p:transition>
     </mc:Choice>
-    <mc:Fallback>
+    <mc:Fallback xmlns="">
       <p:transition spd="med">
         <p:fade/>
       </p:transition>
@@ -18601,13 +21925,13 @@
   <p:clrMapOvr>
     <a:masterClrMapping/>
   </p:clrMapOvr>
-  <mc:AlternateContent xmlns:mc="http://schemas.openxmlformats.org/markup-compatibility/2006">
-    <mc:Choice xmlns:p14="http://schemas.microsoft.com/office/powerpoint/2010/main" Requires="p14">
+  <mc:AlternateContent xmlns:mc="http://schemas.openxmlformats.org/markup-compatibility/2006" xmlns:p14="http://schemas.microsoft.com/office/powerpoint/2010/main">
+    <mc:Choice Requires="p14">
       <p:transition spd="med" p14:dur="700">
         <p:fade/>
       </p:transition>
     </mc:Choice>
-    <mc:Fallback>
+    <mc:Fallback xmlns="">
       <p:transition spd="med">
         <p:fade/>
       </p:transition>
@@ -20288,13 +23612,13 @@
   <p:clrMapOvr>
     <a:masterClrMapping/>
   </p:clrMapOvr>
-  <mc:AlternateContent xmlns:mc="http://schemas.openxmlformats.org/markup-compatibility/2006">
-    <mc:Choice xmlns:p14="http://schemas.microsoft.com/office/powerpoint/2010/main" Requires="p14">
+  <mc:AlternateContent xmlns:mc="http://schemas.openxmlformats.org/markup-compatibility/2006" xmlns:p14="http://schemas.microsoft.com/office/powerpoint/2010/main">
+    <mc:Choice Requires="p14">
       <p:transition spd="med" p14:dur="700">
         <p:fade/>
       </p:transition>
     </mc:Choice>
-    <mc:Fallback>
+    <mc:Fallback xmlns="">
       <p:transition spd="med">
         <p:fade/>
       </p:transition>

</xml_diff>